<commit_message>
updated readme and slides
</commit_message>
<xml_diff>
--- a/talk/slides.pptx
+++ b/talk/slides.pptx
@@ -13,14 +13,19 @@
     <p:sldId id="283" r:id="rId7"/>
     <p:sldId id="284" r:id="rId8"/>
     <p:sldId id="268" r:id="rId9"/>
-    <p:sldId id="285" r:id="rId10"/>
-    <p:sldId id="286" r:id="rId11"/>
-    <p:sldId id="288" r:id="rId12"/>
-    <p:sldId id="289" r:id="rId13"/>
-    <p:sldId id="290" r:id="rId14"/>
-    <p:sldId id="273" r:id="rId15"/>
-    <p:sldId id="274" r:id="rId16"/>
-    <p:sldId id="278" r:id="rId17"/>
+    <p:sldId id="295" r:id="rId10"/>
+    <p:sldId id="285" r:id="rId11"/>
+    <p:sldId id="286" r:id="rId12"/>
+    <p:sldId id="288" r:id="rId13"/>
+    <p:sldId id="289" r:id="rId14"/>
+    <p:sldId id="290" r:id="rId15"/>
+    <p:sldId id="291" r:id="rId16"/>
+    <p:sldId id="292" r:id="rId17"/>
+    <p:sldId id="293" r:id="rId18"/>
+    <p:sldId id="294" r:id="rId19"/>
+    <p:sldId id="278" r:id="rId20"/>
+    <p:sldId id="273" r:id="rId21"/>
+    <p:sldId id="274" r:id="rId22"/>
   </p:sldIdLst>
   <p:sldSz cx="12192000" cy="6858000"/>
   <p:notesSz cx="6858000" cy="9144000"/>
@@ -611,7 +616,7 @@
           <a:p>
             <a:fld id="{77923778-D427-4F38-A95D-1E8FBB0BA0F0}" type="datetimeFigureOut">
               <a:rPr lang="en-AU" smtClean="0"/>
-              <a:t>17/11/2017</a:t>
+              <a:t>22-Nov-17</a:t>
             </a:fld>
             <a:endParaRPr lang="en-AU"/>
           </a:p>
@@ -839,7 +844,7 @@
           <a:p>
             <a:fld id="{77923778-D427-4F38-A95D-1E8FBB0BA0F0}" type="datetimeFigureOut">
               <a:rPr lang="en-AU" smtClean="0"/>
-              <a:t>17/11/2017</a:t>
+              <a:t>22-Nov-17</a:t>
             </a:fld>
             <a:endParaRPr lang="en-AU"/>
           </a:p>
@@ -1019,7 +1024,7 @@
           <a:p>
             <a:fld id="{77923778-D427-4F38-A95D-1E8FBB0BA0F0}" type="datetimeFigureOut">
               <a:rPr lang="en-AU" smtClean="0"/>
-              <a:t>17/11/2017</a:t>
+              <a:t>22-Nov-17</a:t>
             </a:fld>
             <a:endParaRPr lang="en-AU"/>
           </a:p>
@@ -1189,7 +1194,7 @@
           <a:p>
             <a:fld id="{77923778-D427-4F38-A95D-1E8FBB0BA0F0}" type="datetimeFigureOut">
               <a:rPr lang="en-AU" smtClean="0"/>
-              <a:t>17/11/2017</a:t>
+              <a:t>22-Nov-17</a:t>
             </a:fld>
             <a:endParaRPr lang="en-AU"/>
           </a:p>
@@ -1443,7 +1448,7 @@
           <a:p>
             <a:fld id="{77923778-D427-4F38-A95D-1E8FBB0BA0F0}" type="datetimeFigureOut">
               <a:rPr lang="en-AU" smtClean="0"/>
-              <a:t>17/11/2017</a:t>
+              <a:t>22-Nov-17</a:t>
             </a:fld>
             <a:endParaRPr lang="en-AU"/>
           </a:p>
@@ -1769,7 +1774,7 @@
           <a:p>
             <a:fld id="{77923778-D427-4F38-A95D-1E8FBB0BA0F0}" type="datetimeFigureOut">
               <a:rPr lang="en-AU" smtClean="0"/>
-              <a:t>17/11/2017</a:t>
+              <a:t>22-Nov-17</a:t>
             </a:fld>
             <a:endParaRPr lang="en-AU"/>
           </a:p>
@@ -2220,7 +2225,7 @@
           <a:p>
             <a:fld id="{77923778-D427-4F38-A95D-1E8FBB0BA0F0}" type="datetimeFigureOut">
               <a:rPr lang="en-AU" smtClean="0"/>
-              <a:t>17/11/2017</a:t>
+              <a:t>22-Nov-17</a:t>
             </a:fld>
             <a:endParaRPr lang="en-AU"/>
           </a:p>
@@ -2338,7 +2343,7 @@
           <a:p>
             <a:fld id="{77923778-D427-4F38-A95D-1E8FBB0BA0F0}" type="datetimeFigureOut">
               <a:rPr lang="en-AU" smtClean="0"/>
-              <a:t>17/11/2017</a:t>
+              <a:t>22-Nov-17</a:t>
             </a:fld>
             <a:endParaRPr lang="en-AU"/>
           </a:p>
@@ -2433,7 +2438,7 @@
           <a:p>
             <a:fld id="{77923778-D427-4F38-A95D-1E8FBB0BA0F0}" type="datetimeFigureOut">
               <a:rPr lang="en-AU" smtClean="0"/>
-              <a:t>17/11/2017</a:t>
+              <a:t>22-Nov-17</a:t>
             </a:fld>
             <a:endParaRPr lang="en-AU"/>
           </a:p>
@@ -2720,7 +2725,7 @@
           <a:p>
             <a:fld id="{77923778-D427-4F38-A95D-1E8FBB0BA0F0}" type="datetimeFigureOut">
               <a:rPr lang="en-AU" smtClean="0"/>
-              <a:t>17/11/2017</a:t>
+              <a:t>22-Nov-17</a:t>
             </a:fld>
             <a:endParaRPr lang="en-AU"/>
           </a:p>
@@ -3042,7 +3047,7 @@
           <a:p>
             <a:fld id="{77923778-D427-4F38-A95D-1E8FBB0BA0F0}" type="datetimeFigureOut">
               <a:rPr lang="en-AU" smtClean="0"/>
-              <a:t>17/11/2017</a:t>
+              <a:t>22-Nov-17</a:t>
             </a:fld>
             <a:endParaRPr lang="en-AU"/>
           </a:p>
@@ -3296,7 +3301,7 @@
           <a:p>
             <a:fld id="{77923778-D427-4F38-A95D-1E8FBB0BA0F0}" type="datetimeFigureOut">
               <a:rPr lang="en-AU" smtClean="0"/>
-              <a:t>17/11/2017</a:t>
+              <a:t>22-Nov-17</a:t>
             </a:fld>
             <a:endParaRPr lang="en-AU"/>
           </a:p>
@@ -3943,7 +3948,7 @@
                 </a:solidFill>
                 <a:latin typeface="Lato" panose="020F0502020204030203" pitchFamily="34" charset="0"/>
               </a:rPr>
-              <a:t>Data Structures</a:t>
+              <a:t>Modules &amp; Functions</a:t>
             </a:r>
             <a:endParaRPr lang="en-AU" dirty="0"/>
           </a:p>
@@ -3973,7 +3978,7 @@
         </p:spPr>
         <p:txBody>
           <a:bodyPr>
-            <a:normAutofit/>
+            <a:noAutofit/>
           </a:bodyPr>
           <a:lstStyle/>
           <a:p>
@@ -3981,40 +3986,18 @@
               <a:buNone/>
             </a:pPr>
             <a:r>
-              <a:rPr lang="en-AU" sz="3600" b="1" u="sng" dirty="0">
-                <a:latin typeface="Consolas" panose="020B0609020204030204" pitchFamily="49" charset="0"/>
-              </a:rPr>
-              <a:t>Atoms (aka symbols):</a:t>
-            </a:r>
-          </a:p>
-          <a:p>
-            <a:pPr marL="0" indent="0">
-              <a:buNone/>
-            </a:pPr>
-            <a:r>
-              <a:rPr lang="en-AU" sz="3600" dirty="0">
-                <a:latin typeface="Consolas" panose="020B0609020204030204" pitchFamily="49" charset="0"/>
-              </a:rPr>
-              <a:t>:hello =&gt; :hello</a:t>
-            </a:r>
-          </a:p>
-          <a:p>
-            <a:pPr marL="0" indent="0">
-              <a:buNone/>
-            </a:pPr>
-            <a:r>
-              <a:rPr lang="en-AU" sz="3600" b="1" u="sng" dirty="0">
-                <a:latin typeface="Consolas" panose="020B0609020204030204" pitchFamily="49" charset="0"/>
-              </a:rPr>
-              <a:t>Strings vs. </a:t>
-            </a:r>
-            <a:r>
-              <a:rPr lang="en-AU" sz="3600" b="1" u="sng" dirty="0" err="1">
-                <a:latin typeface="Consolas" panose="020B0609020204030204" pitchFamily="49" charset="0"/>
-              </a:rPr>
-              <a:t>charlists</a:t>
-            </a:r>
-            <a:endParaRPr lang="en-AU" sz="3600" b="1" u="sng" dirty="0">
+              <a:rPr lang="en-AU" sz="2800" dirty="0">
+                <a:latin typeface="Consolas" panose="020B0609020204030204" pitchFamily="49" charset="0"/>
+              </a:rPr>
+              <a:t>#</a:t>
+            </a:r>
+            <a:r>
+              <a:rPr lang="en-AU" sz="2800" dirty="0" err="1">
+                <a:latin typeface="Consolas" panose="020B0609020204030204" pitchFamily="49" charset="0"/>
+              </a:rPr>
+              <a:t>math.exs</a:t>
+            </a:r>
+            <a:endParaRPr lang="en-AU" sz="2800" dirty="0">
               <a:latin typeface="Consolas" panose="020B0609020204030204" pitchFamily="49" charset="0"/>
             </a:endParaRPr>
           </a:p>
@@ -4023,34 +4006,22 @@
               <a:buNone/>
             </a:pPr>
             <a:r>
-              <a:rPr lang="en-AU" sz="3600" dirty="0">
-                <a:latin typeface="Consolas" panose="020B0609020204030204" pitchFamily="49" charset="0"/>
-              </a:rPr>
-              <a:t>"</a:t>
-            </a:r>
-            <a:r>
-              <a:rPr lang="en-AU" sz="3600" dirty="0" err="1">
-                <a:latin typeface="Consolas" panose="020B0609020204030204" pitchFamily="49" charset="0"/>
-              </a:rPr>
-              <a:t>hełło</a:t>
-            </a:r>
-            <a:r>
-              <a:rPr lang="en-AU" sz="3600" dirty="0">
-                <a:latin typeface="Consolas" panose="020B0609020204030204" pitchFamily="49" charset="0"/>
-              </a:rPr>
-              <a:t>" =&gt; "</a:t>
-            </a:r>
-            <a:r>
-              <a:rPr lang="en-AU" sz="3600" dirty="0" err="1">
-                <a:latin typeface="Consolas" panose="020B0609020204030204" pitchFamily="49" charset="0"/>
-              </a:rPr>
-              <a:t>hełło</a:t>
-            </a:r>
-            <a:r>
-              <a:rPr lang="en-AU" sz="3600" dirty="0">
-                <a:latin typeface="Consolas" panose="020B0609020204030204" pitchFamily="49" charset="0"/>
-              </a:rPr>
-              <a:t>“</a:t>
+              <a:rPr lang="en-AU" sz="2800" b="1" dirty="0" err="1">
+                <a:latin typeface="Consolas" panose="020B0609020204030204" pitchFamily="49" charset="0"/>
+              </a:rPr>
+              <a:t>defmodule</a:t>
+            </a:r>
+            <a:r>
+              <a:rPr lang="en-AU" sz="2800" dirty="0">
+                <a:latin typeface="Consolas" panose="020B0609020204030204" pitchFamily="49" charset="0"/>
+              </a:rPr>
+              <a:t> Math </a:t>
+            </a:r>
+            <a:r>
+              <a:rPr lang="en-AU" sz="2800" b="1" dirty="0">
+                <a:latin typeface="Consolas" panose="020B0609020204030204" pitchFamily="49" charset="0"/>
+              </a:rPr>
+              <a:t>do</a:t>
             </a:r>
           </a:p>
           <a:p>
@@ -4058,30 +4029,176 @@
               <a:buNone/>
             </a:pPr>
             <a:r>
-              <a:rPr lang="en-AU" sz="3600" dirty="0">
-                <a:latin typeface="Consolas" panose="020B0609020204030204" pitchFamily="49" charset="0"/>
-              </a:rPr>
-              <a:t>'</a:t>
-            </a:r>
-            <a:r>
-              <a:rPr lang="en-AU" sz="3600" dirty="0" err="1">
-                <a:latin typeface="Consolas" panose="020B0609020204030204" pitchFamily="49" charset="0"/>
-              </a:rPr>
-              <a:t>hełło</a:t>
-            </a:r>
-            <a:r>
-              <a:rPr lang="en-AU" sz="3600" dirty="0">
-                <a:latin typeface="Consolas" panose="020B0609020204030204" pitchFamily="49" charset="0"/>
-              </a:rPr>
-              <a:t>' =&gt; [104, 101, 322, 322, 111]</a:t>
-            </a:r>
+              <a:rPr lang="en-AU" sz="2800" b="1" dirty="0">
+                <a:latin typeface="Consolas" panose="020B0609020204030204" pitchFamily="49" charset="0"/>
+              </a:rPr>
+              <a:t>	</a:t>
+            </a:r>
+            <a:r>
+              <a:rPr lang="en-AU" sz="2800" dirty="0">
+                <a:latin typeface="Consolas" panose="020B0609020204030204" pitchFamily="49" charset="0"/>
+              </a:rPr>
+              <a:t>#Named function</a:t>
+            </a:r>
+            <a:endParaRPr lang="en-AU" sz="2800" b="1" dirty="0">
+              <a:latin typeface="Consolas" panose="020B0609020204030204" pitchFamily="49" charset="0"/>
+            </a:endParaRPr>
+          </a:p>
+          <a:p>
+            <a:pPr marL="0" indent="0">
+              <a:buNone/>
+            </a:pPr>
+            <a:r>
+              <a:rPr lang="en-AU" sz="2800" b="1" dirty="0">
+                <a:latin typeface="Consolas" panose="020B0609020204030204" pitchFamily="49" charset="0"/>
+              </a:rPr>
+              <a:t>	def</a:t>
+            </a:r>
+            <a:r>
+              <a:rPr lang="en-AU" sz="2800" dirty="0">
+                <a:latin typeface="Consolas" panose="020B0609020204030204" pitchFamily="49" charset="0"/>
+              </a:rPr>
+              <a:t> sum(a, b) </a:t>
+            </a:r>
+            <a:r>
+              <a:rPr lang="en-AU" sz="2800" b="1" dirty="0">
+                <a:latin typeface="Consolas" panose="020B0609020204030204" pitchFamily="49" charset="0"/>
+              </a:rPr>
+              <a:t>do </a:t>
+            </a:r>
+            <a:r>
+              <a:rPr lang="en-AU" sz="2800" dirty="0">
+                <a:latin typeface="Consolas" panose="020B0609020204030204" pitchFamily="49" charset="0"/>
+              </a:rPr>
+              <a:t>a + b </a:t>
+            </a:r>
+            <a:r>
+              <a:rPr lang="en-AU" sz="2800" b="1" dirty="0">
+                <a:latin typeface="Consolas" panose="020B0609020204030204" pitchFamily="49" charset="0"/>
+              </a:rPr>
+              <a:t>end</a:t>
+            </a:r>
+          </a:p>
+          <a:p>
+            <a:pPr marL="0" indent="0">
+              <a:buNone/>
+            </a:pPr>
+            <a:r>
+              <a:rPr lang="en-AU" sz="2800" b="1" dirty="0">
+                <a:latin typeface="Consolas" panose="020B0609020204030204" pitchFamily="49" charset="0"/>
+              </a:rPr>
+              <a:t>end</a:t>
+            </a:r>
+          </a:p>
+          <a:p>
+            <a:pPr marL="0" indent="0">
+              <a:buNone/>
+            </a:pPr>
+            <a:r>
+              <a:rPr lang="en-AU" sz="2800" dirty="0">
+                <a:latin typeface="Consolas" panose="020B0609020204030204" pitchFamily="49" charset="0"/>
+              </a:rPr>
+              <a:t>#Anonymous function</a:t>
+            </a:r>
+          </a:p>
+          <a:p>
+            <a:pPr marL="0" indent="0">
+              <a:buNone/>
+            </a:pPr>
+            <a:r>
+              <a:rPr lang="en-AU" sz="2800" dirty="0">
+                <a:latin typeface="Consolas" panose="020B0609020204030204" pitchFamily="49" charset="0"/>
+              </a:rPr>
+              <a:t>sum </a:t>
+            </a:r>
+            <a:r>
+              <a:rPr lang="en-AU" sz="2800" b="1" dirty="0">
+                <a:latin typeface="Consolas" panose="020B0609020204030204" pitchFamily="49" charset="0"/>
+              </a:rPr>
+              <a:t>= </a:t>
+            </a:r>
+            <a:r>
+              <a:rPr lang="en-AU" sz="2800" b="1" dirty="0" err="1">
+                <a:latin typeface="Consolas" panose="020B0609020204030204" pitchFamily="49" charset="0"/>
+              </a:rPr>
+              <a:t>fn</a:t>
+            </a:r>
+            <a:r>
+              <a:rPr lang="en-AU" sz="2800" dirty="0">
+                <a:latin typeface="Consolas" panose="020B0609020204030204" pitchFamily="49" charset="0"/>
+              </a:rPr>
+              <a:t> </a:t>
+            </a:r>
+            <a:r>
+              <a:rPr lang="en-AU" sz="2800" dirty="0" err="1">
+                <a:latin typeface="Consolas" panose="020B0609020204030204" pitchFamily="49" charset="0"/>
+              </a:rPr>
+              <a:t>a,b</a:t>
+            </a:r>
+            <a:r>
+              <a:rPr lang="en-AU" sz="2800" dirty="0">
+                <a:latin typeface="Consolas" panose="020B0609020204030204" pitchFamily="49" charset="0"/>
+              </a:rPr>
+              <a:t> </a:t>
+            </a:r>
+            <a:r>
+              <a:rPr lang="en-AU" sz="2800" b="1" dirty="0">
+                <a:latin typeface="Consolas" panose="020B0609020204030204" pitchFamily="49" charset="0"/>
+              </a:rPr>
+              <a:t>-&gt;</a:t>
+            </a:r>
+            <a:r>
+              <a:rPr lang="en-AU" sz="2800" dirty="0">
+                <a:latin typeface="Consolas" panose="020B0609020204030204" pitchFamily="49" charset="0"/>
+              </a:rPr>
+              <a:t> a + b </a:t>
+            </a:r>
+            <a:r>
+              <a:rPr lang="en-AU" sz="2800" b="1" dirty="0">
+                <a:latin typeface="Consolas" panose="020B0609020204030204" pitchFamily="49" charset="0"/>
+              </a:rPr>
+              <a:t>end </a:t>
+            </a:r>
+            <a:r>
+              <a:rPr lang="en-AU" sz="2800" dirty="0">
+                <a:latin typeface="Consolas" panose="020B0609020204030204" pitchFamily="49" charset="0"/>
+              </a:rPr>
+              <a:t>#invoked as sum</a:t>
+            </a:r>
+            <a:r>
+              <a:rPr lang="en-AU" sz="2800" b="1" u="sng" dirty="0">
+                <a:latin typeface="Consolas" panose="020B0609020204030204" pitchFamily="49" charset="0"/>
+              </a:rPr>
+              <a:t>.</a:t>
+            </a:r>
+            <a:r>
+              <a:rPr lang="en-AU" sz="2800" dirty="0">
+                <a:latin typeface="Consolas" panose="020B0609020204030204" pitchFamily="49" charset="0"/>
+              </a:rPr>
+              <a:t>(</a:t>
+            </a:r>
+            <a:r>
+              <a:rPr lang="en-AU" sz="2800" dirty="0" err="1">
+                <a:latin typeface="Consolas" panose="020B0609020204030204" pitchFamily="49" charset="0"/>
+              </a:rPr>
+              <a:t>a,b</a:t>
+            </a:r>
+            <a:r>
+              <a:rPr lang="en-AU" sz="2800" dirty="0">
+                <a:latin typeface="Consolas" panose="020B0609020204030204" pitchFamily="49" charset="0"/>
+              </a:rPr>
+              <a:t>)</a:t>
+            </a:r>
+            <a:endParaRPr lang="en-AU" sz="2800" b="1" dirty="0">
+              <a:latin typeface="Consolas" panose="020B0609020204030204" pitchFamily="49" charset="0"/>
+            </a:endParaRPr>
           </a:p>
         </p:txBody>
       </p:sp>
     </p:spTree>
     <p:extLst>
       <p:ext uri="{BB962C8B-B14F-4D97-AF65-F5344CB8AC3E}">
-        <p14:creationId xmlns:p14="http://schemas.microsoft.com/office/powerpoint/2010/main" val="3354330944"/>
+        <p14:creationId xmlns:p14="http://schemas.microsoft.com/office/powerpoint/2010/main" val="324277023"/>
       </p:ext>
     </p:extLst>
   </p:cSld>
@@ -4145,7 +4262,7 @@
                 </a:solidFill>
                 <a:latin typeface="Lato" panose="020F0502020204030203" pitchFamily="34" charset="0"/>
               </a:rPr>
-              <a:t>Data Structures cont.</a:t>
+              <a:t>Data Structures</a:t>
             </a:r>
             <a:endParaRPr lang="en-AU" dirty="0"/>
           </a:p>
@@ -4186,13 +4303,35 @@
               <a:rPr lang="en-AU" sz="3600" b="1" u="sng" dirty="0">
                 <a:latin typeface="Consolas" panose="020B0609020204030204" pitchFamily="49" charset="0"/>
               </a:rPr>
-              <a:t>(Linked) Lists:</a:t>
-            </a:r>
+              <a:t>Atoms (aka symbols):</a:t>
+            </a:r>
+          </a:p>
+          <a:p>
+            <a:pPr marL="0" indent="0">
+              <a:buNone/>
+            </a:pPr>
             <a:r>
               <a:rPr lang="en-AU" sz="3600" dirty="0">
                 <a:latin typeface="Consolas" panose="020B0609020204030204" pitchFamily="49" charset="0"/>
               </a:rPr>
-              <a:t> list = [1,2]</a:t>
+              <a:t>:hello =&gt; :hello</a:t>
+            </a:r>
+          </a:p>
+          <a:p>
+            <a:pPr marL="0" indent="0">
+              <a:buNone/>
+            </a:pPr>
+            <a:r>
+              <a:rPr lang="en-AU" sz="3600" b="1" u="sng" dirty="0">
+                <a:latin typeface="Consolas" panose="020B0609020204030204" pitchFamily="49" charset="0"/>
+              </a:rPr>
+              <a:t>Strings vs. </a:t>
+            </a:r>
+            <a:r>
+              <a:rPr lang="en-AU" sz="3600" b="1" u="sng" dirty="0" err="1">
+                <a:latin typeface="Consolas" panose="020B0609020204030204" pitchFamily="49" charset="0"/>
+              </a:rPr>
+              <a:t>charlists</a:t>
             </a:r>
             <a:endParaRPr lang="en-AU" sz="3600" b="1" u="sng" dirty="0">
               <a:latin typeface="Consolas" panose="020B0609020204030204" pitchFamily="49" charset="0"/>
@@ -4206,7 +4345,31 @@
               <a:rPr lang="en-AU" sz="3600" dirty="0">
                 <a:latin typeface="Consolas" panose="020B0609020204030204" pitchFamily="49" charset="0"/>
               </a:rPr>
-              <a:t>[0] ++ list =&gt; [0,1,2] #fast</a:t>
+              <a:t>"</a:t>
+            </a:r>
+            <a:r>
+              <a:rPr lang="en-AU" sz="3600" dirty="0" err="1">
+                <a:latin typeface="Consolas" panose="020B0609020204030204" pitchFamily="49" charset="0"/>
+              </a:rPr>
+              <a:t>hełło</a:t>
+            </a:r>
+            <a:r>
+              <a:rPr lang="en-AU" sz="3600" dirty="0">
+                <a:latin typeface="Consolas" panose="020B0609020204030204" pitchFamily="49" charset="0"/>
+              </a:rPr>
+              <a:t>" =&gt; "</a:t>
+            </a:r>
+            <a:r>
+              <a:rPr lang="en-AU" sz="3600" dirty="0" err="1">
+                <a:latin typeface="Consolas" panose="020B0609020204030204" pitchFamily="49" charset="0"/>
+              </a:rPr>
+              <a:t>hełło</a:t>
+            </a:r>
+            <a:r>
+              <a:rPr lang="en-AU" sz="3600" dirty="0">
+                <a:latin typeface="Consolas" panose="020B0609020204030204" pitchFamily="49" charset="0"/>
+              </a:rPr>
+              <a:t>“</a:t>
             </a:r>
           </a:p>
           <a:p>
@@ -4217,58 +4380,19 @@
               <a:rPr lang="en-AU" sz="3600" dirty="0">
                 <a:latin typeface="Consolas" panose="020B0609020204030204" pitchFamily="49" charset="0"/>
               </a:rPr>
-              <a:t>list ++ [3] =&gt; [1,2,3] #slow</a:t>
-            </a:r>
-          </a:p>
-          <a:p>
-            <a:pPr marL="0" indent="0">
-              <a:buNone/>
-            </a:pPr>
-            <a:r>
-              <a:rPr lang="en-AU" sz="3600" b="1" u="sng" dirty="0">
-                <a:latin typeface="Consolas" panose="020B0609020204030204" pitchFamily="49" charset="0"/>
-              </a:rPr>
-              <a:t>Tuples:</a:t>
+              <a:t>'</a:t>
+            </a:r>
+            <a:r>
+              <a:rPr lang="en-AU" sz="3600" dirty="0" err="1">
+                <a:latin typeface="Consolas" panose="020B0609020204030204" pitchFamily="49" charset="0"/>
+              </a:rPr>
+              <a:t>hełło</a:t>
             </a:r>
             <a:r>
               <a:rPr lang="en-AU" sz="3600" dirty="0">
                 <a:latin typeface="Consolas" panose="020B0609020204030204" pitchFamily="49" charset="0"/>
               </a:rPr>
-              <a:t> tuple = {5,6}</a:t>
-            </a:r>
-          </a:p>
-          <a:p>
-            <a:pPr marL="0" indent="0">
-              <a:buNone/>
-            </a:pPr>
-            <a:r>
-              <a:rPr lang="en-AU" sz="3600" dirty="0" err="1">
-                <a:latin typeface="Consolas" panose="020B0609020204030204" pitchFamily="49" charset="0"/>
-              </a:rPr>
-              <a:t>elem</a:t>
-            </a:r>
-            <a:r>
-              <a:rPr lang="en-AU" sz="3600" dirty="0">
-                <a:latin typeface="Consolas" panose="020B0609020204030204" pitchFamily="49" charset="0"/>
-              </a:rPr>
-              <a:t>(tuple, 1) =&gt; 6 #fast</a:t>
-            </a:r>
-          </a:p>
-          <a:p>
-            <a:pPr marL="0" indent="0">
-              <a:buNone/>
-            </a:pPr>
-            <a:r>
-              <a:rPr lang="en-AU" sz="3600" dirty="0" err="1">
-                <a:latin typeface="Consolas" panose="020B0609020204030204" pitchFamily="49" charset="0"/>
-              </a:rPr>
-              <a:t>put_elem</a:t>
-            </a:r>
-            <a:r>
-              <a:rPr lang="en-AU" sz="3600" dirty="0">
-                <a:latin typeface="Consolas" panose="020B0609020204030204" pitchFamily="49" charset="0"/>
-              </a:rPr>
-              <a:t>(tuple,2,7) =&gt; {5,6,7} #slow</a:t>
+              <a:t>' =&gt; [104, 101, 322, 322, 111]</a:t>
             </a:r>
           </a:p>
         </p:txBody>
@@ -4276,7 +4400,7 @@
     </p:spTree>
     <p:extLst>
       <p:ext uri="{BB962C8B-B14F-4D97-AF65-F5344CB8AC3E}">
-        <p14:creationId xmlns:p14="http://schemas.microsoft.com/office/powerpoint/2010/main" val="480615135"/>
+        <p14:creationId xmlns:p14="http://schemas.microsoft.com/office/powerpoint/2010/main" val="3354330944"/>
       </p:ext>
     </p:extLst>
   </p:cSld>
@@ -4319,18 +4443,13 @@
             <p:ph type="title"/>
           </p:nvPr>
         </p:nvSpPr>
-        <p:spPr>
-          <a:xfrm>
-            <a:off x="1261872" y="365760"/>
-            <a:ext cx="9692640" cy="1325562"/>
-          </a:xfrm>
-        </p:spPr>
+        <p:spPr/>
         <p:txBody>
           <a:bodyPr/>
           <a:lstStyle/>
           <a:p>
             <a:r>
-              <a:rPr lang="en-AU" sz="6600">
+              <a:rPr lang="en-AU" sz="6600" dirty="0">
                 <a:solidFill>
                   <a:srgbClr val="000000"/>
                 </a:solidFill>
@@ -4339,7 +4458,7 @@
               <a:t>Basics: </a:t>
             </a:r>
             <a:r>
-              <a:rPr lang="en-AU" sz="5400">
+              <a:rPr lang="en-AU" sz="5400" dirty="0">
                 <a:solidFill>
                   <a:srgbClr val="000000"/>
                 </a:solidFill>
@@ -4386,24 +4505,13 @@
               <a:rPr lang="en-AU" sz="3600" b="1" u="sng" dirty="0">
                 <a:latin typeface="Consolas" panose="020B0609020204030204" pitchFamily="49" charset="0"/>
               </a:rPr>
-              <a:t>Keyword Lists:</a:t>
+              <a:t>(Linked) Lists:</a:t>
             </a:r>
             <a:r>
               <a:rPr lang="en-AU" sz="3600" dirty="0">
                 <a:latin typeface="Consolas" panose="020B0609020204030204" pitchFamily="49" charset="0"/>
               </a:rPr>
-              <a:t> </a:t>
-            </a:r>
-          </a:p>
-          <a:p>
-            <a:pPr marL="0" indent="0">
-              <a:buNone/>
-            </a:pPr>
-            <a:r>
-              <a:rPr lang="en-AU" sz="3600" dirty="0">
-                <a:latin typeface="Consolas" panose="020B0609020204030204" pitchFamily="49" charset="0"/>
-              </a:rPr>
-              <a:t>list = [{:a, 1},{:b, 2}, {:a, 3}]</a:t>
+              <a:t> list = [1,2]</a:t>
             </a:r>
             <a:endParaRPr lang="en-AU" sz="3600" b="1" u="sng" dirty="0">
               <a:latin typeface="Consolas" panose="020B0609020204030204" pitchFamily="49" charset="0"/>
@@ -4417,7 +4525,7 @@
               <a:rPr lang="en-AU" sz="3600" dirty="0">
                 <a:latin typeface="Consolas" panose="020B0609020204030204" pitchFamily="49" charset="0"/>
               </a:rPr>
-              <a:t>Used for options or when you need to preserve use ordering… For everything else, there are maps.</a:t>
+              <a:t>[0] ++ list =&gt; [0,1,2] #fast</a:t>
             </a:r>
           </a:p>
           <a:p>
@@ -4425,16 +4533,61 @@
               <a:buNone/>
             </a:pPr>
             <a:r>
+              <a:rPr lang="en-AU" sz="3600" dirty="0">
+                <a:latin typeface="Consolas" panose="020B0609020204030204" pitchFamily="49" charset="0"/>
+              </a:rPr>
+              <a:t>list ++ [3] =&gt; [1,2,3] #slow</a:t>
+            </a:r>
+          </a:p>
+          <a:p>
+            <a:pPr marL="0" indent="0">
+              <a:buNone/>
+            </a:pPr>
+            <a:r>
               <a:rPr lang="en-AU" sz="3600" b="1" u="sng" dirty="0">
                 <a:latin typeface="Consolas" panose="020B0609020204030204" pitchFamily="49" charset="0"/>
               </a:rPr>
-              <a:t>Maps:</a:t>
+              <a:t>Tuples:</a:t>
             </a:r>
             <a:r>
               <a:rPr lang="en-AU" sz="3600" dirty="0">
                 <a:latin typeface="Consolas" panose="020B0609020204030204" pitchFamily="49" charset="0"/>
               </a:rPr>
-              <a:t> map = %{:a =&gt; 1,2 =&gt; b}</a:t>
+              <a:t> tuple = {5,6}</a:t>
+            </a:r>
+          </a:p>
+          <a:p>
+            <a:pPr marL="0" indent="0">
+              <a:buNone/>
+            </a:pPr>
+            <a:r>
+              <a:rPr lang="en-AU" sz="3600" dirty="0" err="1">
+                <a:latin typeface="Consolas" panose="020B0609020204030204" pitchFamily="49" charset="0"/>
+              </a:rPr>
+              <a:t>elem</a:t>
+            </a:r>
+            <a:r>
+              <a:rPr lang="en-AU" sz="3600" dirty="0">
+                <a:latin typeface="Consolas" panose="020B0609020204030204" pitchFamily="49" charset="0"/>
+              </a:rPr>
+              <a:t>(tuple, 1) =&gt; 6 #fast</a:t>
+            </a:r>
+          </a:p>
+          <a:p>
+            <a:pPr marL="0" indent="0">
+              <a:buNone/>
+            </a:pPr>
+            <a:r>
+              <a:rPr lang="en-AU" sz="3600" dirty="0" err="1">
+                <a:latin typeface="Consolas" panose="020B0609020204030204" pitchFamily="49" charset="0"/>
+              </a:rPr>
+              <a:t>put_elem</a:t>
+            </a:r>
+            <a:r>
+              <a:rPr lang="en-AU" sz="3600" dirty="0">
+                <a:latin typeface="Consolas" panose="020B0609020204030204" pitchFamily="49" charset="0"/>
+              </a:rPr>
+              <a:t>(tuple,2,7) =&gt; {5,6,7} #slow</a:t>
             </a:r>
           </a:p>
         </p:txBody>
@@ -4442,7 +4595,7 @@
     </p:spTree>
     <p:extLst>
       <p:ext uri="{BB962C8B-B14F-4D97-AF65-F5344CB8AC3E}">
-        <p14:creationId xmlns:p14="http://schemas.microsoft.com/office/powerpoint/2010/main" val="1471543814"/>
+        <p14:creationId xmlns:p14="http://schemas.microsoft.com/office/powerpoint/2010/main" val="480615135"/>
       </p:ext>
     </p:extLst>
   </p:cSld>
@@ -4485,19 +4638,33 @@
             <p:ph type="title"/>
           </p:nvPr>
         </p:nvSpPr>
-        <p:spPr/>
+        <p:spPr>
+          <a:xfrm>
+            <a:off x="1261872" y="365760"/>
+            <a:ext cx="9692640" cy="1325562"/>
+          </a:xfrm>
+        </p:spPr>
         <p:txBody>
           <a:bodyPr/>
           <a:lstStyle/>
           <a:p>
             <a:r>
-              <a:rPr lang="en-AU" sz="6600" dirty="0">
+              <a:rPr lang="en-AU" sz="6600">
                 <a:solidFill>
                   <a:srgbClr val="000000"/>
                 </a:solidFill>
                 <a:latin typeface="Lato" panose="020F0502020204030203" pitchFamily="34" charset="0"/>
               </a:rPr>
-              <a:t>Interesting features</a:t>
+              <a:t>Basics: </a:t>
+            </a:r>
+            <a:r>
+              <a:rPr lang="en-AU" sz="5400">
+                <a:solidFill>
+                  <a:srgbClr val="000000"/>
+                </a:solidFill>
+                <a:latin typeface="Lato" panose="020F0502020204030203" pitchFamily="34" charset="0"/>
+              </a:rPr>
+              <a:t>Data Structures cont.</a:t>
             </a:r>
             <a:endParaRPr lang="en-AU" dirty="0"/>
           </a:p>
@@ -4527,35 +4694,37 @@
         </p:spPr>
         <p:txBody>
           <a:bodyPr>
-            <a:normAutofit lnSpcReduction="10000"/>
+            <a:normAutofit/>
           </a:bodyPr>
           <a:lstStyle/>
           <a:p>
-            <a:r>
-              <a:rPr lang="en-AU" sz="4000" dirty="0">
-                <a:latin typeface="Consolas" panose="020B0609020204030204" pitchFamily="49" charset="0"/>
-              </a:rPr>
-              <a:t>Piping &amp; Captures</a:t>
-            </a:r>
-          </a:p>
-          <a:p>
-            <a:r>
-              <a:rPr lang="en-AU" sz="4000" dirty="0">
-                <a:latin typeface="Consolas" panose="020B0609020204030204" pitchFamily="49" charset="0"/>
-              </a:rPr>
-              <a:t>Pattern matching</a:t>
-            </a:r>
-          </a:p>
-          <a:p>
-            <a:r>
-              <a:rPr lang="en-AU" sz="4000" dirty="0">
-                <a:latin typeface="Consolas" panose="020B0609020204030204" pitchFamily="49" charset="0"/>
-              </a:rPr>
-              <a:t>Streams &amp; Lazy Evaluation</a:t>
-            </a:r>
-          </a:p>
-          <a:p>
-            <a:endParaRPr lang="en-AU" sz="4000" dirty="0">
+            <a:pPr marL="0" indent="0">
+              <a:buNone/>
+            </a:pPr>
+            <a:r>
+              <a:rPr lang="en-AU" sz="3600" b="1" u="sng" dirty="0">
+                <a:latin typeface="Consolas" panose="020B0609020204030204" pitchFamily="49" charset="0"/>
+              </a:rPr>
+              <a:t>Keyword Lists:</a:t>
+            </a:r>
+            <a:r>
+              <a:rPr lang="en-AU" sz="3600" dirty="0">
+                <a:latin typeface="Consolas" panose="020B0609020204030204" pitchFamily="49" charset="0"/>
+              </a:rPr>
+              <a:t> </a:t>
+            </a:r>
+          </a:p>
+          <a:p>
+            <a:pPr marL="0" indent="0">
+              <a:buNone/>
+            </a:pPr>
+            <a:r>
+              <a:rPr lang="en-AU" sz="3600" dirty="0">
+                <a:latin typeface="Consolas" panose="020B0609020204030204" pitchFamily="49" charset="0"/>
+              </a:rPr>
+              <a:t>list = [{:a, 1},{:b, 2}, {:a, 3}]</a:t>
+            </a:r>
+            <a:endParaRPr lang="en-AU" sz="3600" b="1" u="sng" dirty="0">
               <a:latin typeface="Consolas" panose="020B0609020204030204" pitchFamily="49" charset="0"/>
             </a:endParaRPr>
           </a:p>
@@ -4564,10 +4733,27 @@
               <a:buNone/>
             </a:pPr>
             <a:r>
-              <a:rPr lang="en-AU" sz="4000" dirty="0">
-                <a:latin typeface="Consolas" panose="020B0609020204030204" pitchFamily="49" charset="0"/>
-              </a:rPr>
-              <a:t>We’ll learn these through the following examples.</a:t>
+              <a:rPr lang="en-AU" sz="3600" dirty="0">
+                <a:latin typeface="Consolas" panose="020B0609020204030204" pitchFamily="49" charset="0"/>
+              </a:rPr>
+              <a:t>Used for options or when you need to preserve use ordering… For everything else, there are maps.</a:t>
+            </a:r>
+          </a:p>
+          <a:p>
+            <a:pPr marL="0" indent="0">
+              <a:buNone/>
+            </a:pPr>
+            <a:r>
+              <a:rPr lang="en-AU" sz="3600" b="1" u="sng" dirty="0">
+                <a:latin typeface="Consolas" panose="020B0609020204030204" pitchFamily="49" charset="0"/>
+              </a:rPr>
+              <a:t>Maps:</a:t>
+            </a:r>
+            <a:r>
+              <a:rPr lang="en-AU" sz="3600" dirty="0">
+                <a:latin typeface="Consolas" panose="020B0609020204030204" pitchFamily="49" charset="0"/>
+              </a:rPr>
+              <a:t> map = %{:a =&gt; 1,2 =&gt; b}</a:t>
             </a:r>
           </a:p>
         </p:txBody>
@@ -4575,7 +4761,7 @@
     </p:spTree>
     <p:extLst>
       <p:ext uri="{BB962C8B-B14F-4D97-AF65-F5344CB8AC3E}">
-        <p14:creationId xmlns:p14="http://schemas.microsoft.com/office/powerpoint/2010/main" val="1969835520"/>
+        <p14:creationId xmlns:p14="http://schemas.microsoft.com/office/powerpoint/2010/main" val="1471543814"/>
       </p:ext>
     </p:extLst>
   </p:cSld>
@@ -4620,20 +4806,9 @@
         </p:nvSpPr>
         <p:spPr/>
         <p:txBody>
-          <a:bodyPr>
-            <a:normAutofit fontScale="90000"/>
-          </a:bodyPr>
-          <a:lstStyle/>
-          <a:p>
-            <a:r>
-              <a:rPr lang="en-AU" sz="6600" b="1" dirty="0">
-                <a:solidFill>
-                  <a:srgbClr val="000000"/>
-                </a:solidFill>
-                <a:latin typeface="Lato" panose="020F0502020204030203" pitchFamily="34" charset="0"/>
-              </a:rPr>
-              <a:t>Example: </a:t>
-            </a:r>
+          <a:bodyPr/>
+          <a:lstStyle/>
+          <a:p>
             <a:r>
               <a:rPr lang="en-AU" sz="6600" dirty="0">
                 <a:solidFill>
@@ -4641,7 +4816,7 @@
                 </a:solidFill>
                 <a:latin typeface="Lato" panose="020F0502020204030203" pitchFamily="34" charset="0"/>
               </a:rPr>
-              <a:t>nucleotide_count</a:t>
+              <a:t>Interesting features</a:t>
             </a:r>
             <a:endParaRPr lang="en-AU" dirty="0"/>
           </a:p>
@@ -4665,54 +4840,41 @@
         </p:nvSpPr>
         <p:spPr>
           <a:xfrm>
-            <a:off x="1261872" y="2140903"/>
-            <a:ext cx="9692640" cy="4351337"/>
+            <a:off x="1261871" y="2140903"/>
+            <a:ext cx="9863329" cy="4351337"/>
           </a:xfrm>
         </p:spPr>
         <p:txBody>
           <a:bodyPr>
-            <a:noAutofit/>
+            <a:normAutofit lnSpcReduction="10000"/>
           </a:bodyPr>
           <a:lstStyle/>
           <a:p>
-            <a:pPr marL="0" indent="0">
-              <a:buNone/>
-            </a:pPr>
-            <a:r>
-              <a:rPr lang="en-AU" sz="3200" dirty="0">
-                <a:latin typeface="Consolas" panose="020B0609020204030204" pitchFamily="49" charset="0"/>
-              </a:rPr>
-              <a:t>Given a DNA string, compute how many times each nucleotide occurs in the string. DNA is represented by an alphabet of the following nucleotides: 'A', 'C', 'G','T'.</a:t>
-            </a:r>
-          </a:p>
-          <a:p>
-            <a:pPr marL="0" indent="0">
-              <a:buNone/>
-            </a:pPr>
-            <a:br>
-              <a:rPr lang="en-AU" sz="3200" dirty="0">
-                <a:latin typeface="Consolas" panose="020B0609020204030204" pitchFamily="49" charset="0"/>
-              </a:rPr>
-            </a:br>
-            <a:r>
-              <a:rPr lang="en-AU" sz="3200" b="1" dirty="0">
-                <a:latin typeface="Consolas" panose="020B0609020204030204" pitchFamily="49" charset="0"/>
-              </a:rPr>
-              <a:t>open</a:t>
-            </a:r>
-            <a:r>
-              <a:rPr lang="en-AU" sz="3200" dirty="0">
-                <a:latin typeface="Consolas" panose="020B0609020204030204" pitchFamily="49" charset="0"/>
-              </a:rPr>
-              <a:t> ./problems/</a:t>
-            </a:r>
-            <a:r>
-              <a:rPr lang="en-AU" sz="3200" dirty="0" err="1">
-                <a:latin typeface="Consolas" panose="020B0609020204030204" pitchFamily="49" charset="0"/>
-              </a:rPr>
-              <a:t>nucleotide_count.exs</a:t>
-            </a:r>
-            <a:endParaRPr lang="en-AU" sz="3200" dirty="0">
+            <a:r>
+              <a:rPr lang="en-AU" sz="4000" dirty="0">
+                <a:latin typeface="Consolas" panose="020B0609020204030204" pitchFamily="49" charset="0"/>
+              </a:rPr>
+              <a:t>Piping &amp; Captures</a:t>
+            </a:r>
+          </a:p>
+          <a:p>
+            <a:r>
+              <a:rPr lang="en-AU" sz="4000" dirty="0">
+                <a:latin typeface="Consolas" panose="020B0609020204030204" pitchFamily="49" charset="0"/>
+              </a:rPr>
+              <a:t>Pattern matching</a:t>
+            </a:r>
+          </a:p>
+          <a:p>
+            <a:r>
+              <a:rPr lang="en-AU" sz="4000" dirty="0">
+                <a:latin typeface="Consolas" panose="020B0609020204030204" pitchFamily="49" charset="0"/>
+              </a:rPr>
+              <a:t>Streams &amp; Lazy Evaluation</a:t>
+            </a:r>
+          </a:p>
+          <a:p>
+            <a:endParaRPr lang="en-AU" sz="4000" dirty="0">
               <a:latin typeface="Consolas" panose="020B0609020204030204" pitchFamily="49" charset="0"/>
             </a:endParaRPr>
           </a:p>
@@ -4721,59 +4883,18 @@
               <a:buNone/>
             </a:pPr>
             <a:r>
-              <a:rPr lang="en-AU" sz="3200" b="1" dirty="0">
-                <a:latin typeface="Consolas" panose="020B0609020204030204" pitchFamily="49" charset="0"/>
-              </a:rPr>
-              <a:t>elixir</a:t>
-            </a:r>
-            <a:r>
-              <a:rPr lang="en-AU" sz="3200" dirty="0">
-                <a:latin typeface="Consolas" panose="020B0609020204030204" pitchFamily="49" charset="0"/>
-              </a:rPr>
-              <a:t> problems/</a:t>
-            </a:r>
-            <a:r>
-              <a:rPr lang="en-AU" sz="3200" dirty="0" err="1">
-                <a:latin typeface="Consolas" panose="020B0609020204030204" pitchFamily="49" charset="0"/>
-              </a:rPr>
-              <a:t>nucleotide_count.exs</a:t>
-            </a:r>
-            <a:endParaRPr lang="en-AU" sz="3200" dirty="0">
-              <a:latin typeface="Consolas" panose="020B0609020204030204" pitchFamily="49" charset="0"/>
-            </a:endParaRPr>
-          </a:p>
-          <a:p>
-            <a:pPr marL="0" indent="0">
-              <a:buNone/>
-            </a:pPr>
-            <a:r>
-              <a:rPr lang="en-AU" sz="3200" b="1" dirty="0">
-                <a:latin typeface="Consolas" panose="020B0609020204030204" pitchFamily="49" charset="0"/>
-              </a:rPr>
-              <a:t>elixir</a:t>
-            </a:r>
-            <a:r>
-              <a:rPr lang="en-AU" sz="3200" dirty="0">
-                <a:latin typeface="Consolas" panose="020B0609020204030204" pitchFamily="49" charset="0"/>
-              </a:rPr>
-              <a:t> tests/</a:t>
-            </a:r>
-            <a:r>
-              <a:rPr lang="en-AU" sz="3200" dirty="0" err="1">
-                <a:latin typeface="Consolas" panose="020B0609020204030204" pitchFamily="49" charset="0"/>
-              </a:rPr>
-              <a:t>nucleotide_count_test.exs</a:t>
-            </a:r>
-            <a:endParaRPr lang="en-AU" sz="3200" b="1" dirty="0">
-              <a:latin typeface="Consolas" panose="020B0609020204030204" pitchFamily="49" charset="0"/>
-            </a:endParaRPr>
+              <a:rPr lang="en-AU" sz="4000" dirty="0">
+                <a:latin typeface="Consolas" panose="020B0609020204030204" pitchFamily="49" charset="0"/>
+              </a:rPr>
+              <a:t>We’ll learn these through the following examples.</a:t>
+            </a:r>
           </a:p>
         </p:txBody>
       </p:sp>
     </p:spTree>
     <p:extLst>
       <p:ext uri="{BB962C8B-B14F-4D97-AF65-F5344CB8AC3E}">
-        <p14:creationId xmlns:p14="http://schemas.microsoft.com/office/powerpoint/2010/main" val="3088502034"/>
+        <p14:creationId xmlns:p14="http://schemas.microsoft.com/office/powerpoint/2010/main" val="1969835520"/>
       </p:ext>
     </p:extLst>
   </p:cSld>
@@ -4818,20 +4939,9 @@
         </p:nvSpPr>
         <p:spPr/>
         <p:txBody>
-          <a:bodyPr>
-            <a:normAutofit fontScale="90000"/>
-          </a:bodyPr>
-          <a:lstStyle/>
-          <a:p>
-            <a:r>
-              <a:rPr lang="en-AU" sz="6600" b="1" dirty="0">
-                <a:solidFill>
-                  <a:srgbClr val="000000"/>
-                </a:solidFill>
-                <a:latin typeface="Lato" panose="020F0502020204030203" pitchFamily="34" charset="0"/>
-              </a:rPr>
-              <a:t>Example:</a:t>
-            </a:r>
+          <a:bodyPr/>
+          <a:lstStyle/>
+          <a:p>
             <a:r>
               <a:rPr lang="en-AU" sz="6600" dirty="0">
                 <a:solidFill>
@@ -4839,16 +4949,7 @@
                 </a:solidFill>
                 <a:latin typeface="Lato" panose="020F0502020204030203" pitchFamily="34" charset="0"/>
               </a:rPr>
-              <a:t> </a:t>
-            </a:r>
-            <a:r>
-              <a:rPr lang="en-AU" sz="6600" dirty="0" err="1">
-                <a:solidFill>
-                  <a:srgbClr val="000000"/>
-                </a:solidFill>
-                <a:latin typeface="Lato" panose="020F0502020204030203" pitchFamily="34" charset="0"/>
-              </a:rPr>
-              <a:t>secret_handshake</a:t>
+              <a:t>Examples</a:t>
             </a:r>
             <a:endParaRPr lang="en-AU" dirty="0"/>
           </a:p>
@@ -4886,95 +4987,115 @@
               <a:buNone/>
             </a:pPr>
             <a:r>
-              <a:rPr lang="en-AU" sz="3200" dirty="0">
-                <a:latin typeface="Consolas" panose="020B0609020204030204" pitchFamily="49" charset="0"/>
-              </a:rPr>
-              <a:t>Given a decimal number, convert it to binary and then to the appropriate sequence of events for a secret handshake.</a:t>
+              <a:rPr lang="en-AU" sz="2800" b="1" dirty="0">
+                <a:latin typeface="Consolas" panose="020B0609020204030204" pitchFamily="49" charset="0"/>
+              </a:rPr>
+              <a:t>pluck</a:t>
+            </a:r>
+            <a:r>
+              <a:rPr lang="en-AU" sz="2800" dirty="0">
+                <a:latin typeface="Consolas" panose="020B0609020204030204" pitchFamily="49" charset="0"/>
+              </a:rPr>
+              <a:t> – map</a:t>
             </a:r>
           </a:p>
           <a:p>
             <a:pPr marL="0" indent="0">
               <a:buNone/>
             </a:pPr>
-            <a:endParaRPr lang="en-AU" sz="3200" b="1" dirty="0">
-              <a:latin typeface="Consolas" panose="020B0609020204030204" pitchFamily="49" charset="0"/>
-            </a:endParaRPr>
+            <a:r>
+              <a:rPr lang="en-AU" sz="2800" b="1" dirty="0">
+                <a:latin typeface="Consolas" panose="020B0609020204030204" pitchFamily="49" charset="0"/>
+              </a:rPr>
+              <a:t>unique</a:t>
+            </a:r>
+            <a:r>
+              <a:rPr lang="en-AU" sz="2800" dirty="0">
+                <a:latin typeface="Consolas" panose="020B0609020204030204" pitchFamily="49" charset="0"/>
+              </a:rPr>
+              <a:t> – reduce</a:t>
+            </a:r>
           </a:p>
           <a:p>
             <a:pPr marL="0" indent="0">
               <a:buNone/>
             </a:pPr>
             <a:r>
-              <a:rPr lang="en-AU" sz="3200" b="1" dirty="0">
-                <a:latin typeface="Consolas" panose="020B0609020204030204" pitchFamily="49" charset="0"/>
-              </a:rPr>
-              <a:t>open</a:t>
-            </a:r>
-            <a:r>
-              <a:rPr lang="en-AU" sz="3200" dirty="0">
-                <a:latin typeface="Consolas" panose="020B0609020204030204" pitchFamily="49" charset="0"/>
-              </a:rPr>
-              <a:t> ./problems/</a:t>
-            </a:r>
-            <a:r>
-              <a:rPr lang="en-AU" sz="3200" dirty="0" err="1">
-                <a:latin typeface="Consolas" panose="020B0609020204030204" pitchFamily="49" charset="0"/>
-              </a:rPr>
-              <a:t>secret_handshake.exs</a:t>
-            </a:r>
-            <a:endParaRPr lang="en-AU" sz="3200" dirty="0">
-              <a:latin typeface="Consolas" panose="020B0609020204030204" pitchFamily="49" charset="0"/>
-            </a:endParaRPr>
+              <a:rPr lang="en-AU" sz="2800" b="1" dirty="0">
+                <a:latin typeface="Consolas" panose="020B0609020204030204" pitchFamily="49" charset="0"/>
+              </a:rPr>
+              <a:t>match </a:t>
+            </a:r>
+            <a:r>
+              <a:rPr lang="en-AU" sz="2800" dirty="0">
+                <a:latin typeface="Consolas" panose="020B0609020204030204" pitchFamily="49" charset="0"/>
+              </a:rPr>
+              <a:t>– filter</a:t>
+            </a:r>
           </a:p>
           <a:p>
             <a:pPr marL="0" indent="0">
               <a:buNone/>
             </a:pPr>
             <a:r>
-              <a:rPr lang="en-AU" sz="3200" b="1" dirty="0">
-                <a:latin typeface="Consolas" panose="020B0609020204030204" pitchFamily="49" charset="0"/>
-              </a:rPr>
-              <a:t>elixir</a:t>
-            </a:r>
-            <a:r>
-              <a:rPr lang="en-AU" sz="3200" dirty="0">
-                <a:latin typeface="Consolas" panose="020B0609020204030204" pitchFamily="49" charset="0"/>
-              </a:rPr>
-              <a:t> problems/</a:t>
-            </a:r>
-            <a:r>
-              <a:rPr lang="en-AU" sz="3200" dirty="0" err="1">
-                <a:latin typeface="Consolas" panose="020B0609020204030204" pitchFamily="49" charset="0"/>
-              </a:rPr>
-              <a:t>secret_handshake.exs</a:t>
-            </a:r>
-            <a:endParaRPr lang="en-AU" sz="3200" dirty="0">
-              <a:latin typeface="Consolas" panose="020B0609020204030204" pitchFamily="49" charset="0"/>
-            </a:endParaRPr>
+              <a:rPr lang="en-AU" sz="2800" b="1" dirty="0">
+                <a:latin typeface="Consolas" panose="020B0609020204030204" pitchFamily="49" charset="0"/>
+              </a:rPr>
+              <a:t>batsmen</a:t>
+            </a:r>
+            <a:r>
+              <a:rPr lang="en-AU" sz="2800" dirty="0">
+                <a:latin typeface="Consolas" panose="020B0609020204030204" pitchFamily="49" charset="0"/>
+              </a:rPr>
+              <a:t> – map, filter, sort, streams</a:t>
+            </a:r>
           </a:p>
           <a:p>
             <a:pPr marL="0" indent="0">
               <a:buNone/>
             </a:pPr>
             <a:r>
-              <a:rPr lang="en-AU" sz="3200" b="1" dirty="0">
-                <a:latin typeface="Consolas" panose="020B0609020204030204" pitchFamily="49" charset="0"/>
-              </a:rPr>
-              <a:t>elixir </a:t>
-            </a:r>
-            <a:r>
-              <a:rPr lang="en-AU" sz="3200" dirty="0">
-                <a:latin typeface="Consolas" panose="020B0609020204030204" pitchFamily="49" charset="0"/>
-              </a:rPr>
-              <a:t>tests/</a:t>
-            </a:r>
-            <a:r>
-              <a:rPr lang="en-AU" sz="3200" dirty="0" err="1">
-                <a:latin typeface="Consolas" panose="020B0609020204030204" pitchFamily="49" charset="0"/>
-              </a:rPr>
-              <a:t>secret_handshake_test.exs</a:t>
-            </a:r>
-            <a:endParaRPr lang="en-AU" sz="3200" b="1" dirty="0">
+              <a:rPr lang="en-AU" sz="2800" b="1" dirty="0" err="1">
+                <a:latin typeface="Consolas" panose="020B0609020204030204" pitchFamily="49" charset="0"/>
+              </a:rPr>
+              <a:t>nucleotide_count</a:t>
+            </a:r>
+            <a:r>
+              <a:rPr lang="en-AU" sz="2800" b="1" dirty="0">
+                <a:latin typeface="Consolas" panose="020B0609020204030204" pitchFamily="49" charset="0"/>
+              </a:rPr>
+              <a:t> </a:t>
+            </a:r>
+            <a:r>
+              <a:rPr lang="en-AU" sz="2800" dirty="0">
+                <a:latin typeface="Consolas" panose="020B0609020204030204" pitchFamily="49" charset="0"/>
+              </a:rPr>
+              <a:t>– count, list comprehension</a:t>
+            </a:r>
+          </a:p>
+          <a:p>
+            <a:pPr marL="0" indent="0">
+              <a:buNone/>
+            </a:pPr>
+            <a:r>
+              <a:rPr lang="en-AU" sz="2800" b="1" dirty="0" err="1">
+                <a:latin typeface="Consolas" panose="020B0609020204030204" pitchFamily="49" charset="0"/>
+              </a:rPr>
+              <a:t>secret_handshake</a:t>
+            </a:r>
+            <a:r>
+              <a:rPr lang="en-AU" sz="2800" b="1" dirty="0">
+                <a:latin typeface="Consolas" panose="020B0609020204030204" pitchFamily="49" charset="0"/>
+              </a:rPr>
+              <a:t> </a:t>
+            </a:r>
+            <a:r>
+              <a:rPr lang="en-AU" sz="2800" dirty="0">
+                <a:latin typeface="Consolas" panose="020B0609020204030204" pitchFamily="49" charset="0"/>
+              </a:rPr>
+              <a:t>– piping, pattern matching</a:t>
+            </a:r>
+            <a:endParaRPr lang="en-AU" sz="2800" b="1" dirty="0">
               <a:latin typeface="Consolas" panose="020B0609020204030204" pitchFamily="49" charset="0"/>
             </a:endParaRPr>
           </a:p>
@@ -4983,7 +5104,7 @@
     </p:spTree>
     <p:extLst>
       <p:ext uri="{BB962C8B-B14F-4D97-AF65-F5344CB8AC3E}">
-        <p14:creationId xmlns:p14="http://schemas.microsoft.com/office/powerpoint/2010/main" val="2007551810"/>
+        <p14:creationId xmlns:p14="http://schemas.microsoft.com/office/powerpoint/2010/main" val="3243906716"/>
       </p:ext>
     </p:extLst>
   </p:cSld>
@@ -5038,7 +5159,7 @@
                 </a:solidFill>
                 <a:latin typeface="Lato" panose="020F0502020204030203" pitchFamily="34" charset="0"/>
               </a:rPr>
-              <a:t>Example:</a:t>
+              <a:t>Example: </a:t>
             </a:r>
             <a:r>
               <a:rPr lang="en-AU" sz="6600" dirty="0">
@@ -5047,7 +5168,7 @@
                 </a:solidFill>
                 <a:latin typeface="Lato" panose="020F0502020204030203" pitchFamily="34" charset="0"/>
               </a:rPr>
-              <a:t> batsmen</a:t>
+              <a:t>pluck</a:t>
             </a:r>
             <a:endParaRPr lang="en-AU" dirty="0"/>
           </a:p>
@@ -5082,21 +5203,579 @@
           <a:lstStyle/>
           <a:p>
             <a:pPr marL="0" indent="0">
+              <a:lnSpc>
+                <a:spcPct val="150000"/>
+              </a:lnSpc>
               <a:buNone/>
             </a:pPr>
             <a:r>
-              <a:rPr lang="en-AU" sz="3000" dirty="0">
+              <a:rPr lang="en-AU" sz="2800" dirty="0">
+                <a:latin typeface="Consolas" panose="020B0609020204030204" pitchFamily="49" charset="0"/>
+              </a:rPr>
+              <a:t>Using </a:t>
+            </a:r>
+            <a:r>
+              <a:rPr lang="en-AU" sz="2800" dirty="0" err="1">
+                <a:latin typeface="Consolas" panose="020B0609020204030204" pitchFamily="49" charset="0"/>
+              </a:rPr>
+              <a:t>Enum.</a:t>
+            </a:r>
+            <a:r>
+              <a:rPr lang="en-AU" sz="2800" b="1" dirty="0" err="1">
+                <a:latin typeface="Consolas" panose="020B0609020204030204" pitchFamily="49" charset="0"/>
+              </a:rPr>
+              <a:t>map</a:t>
+            </a:r>
+            <a:r>
+              <a:rPr lang="en-AU" sz="2800" dirty="0">
+                <a:latin typeface="Consolas" panose="020B0609020204030204" pitchFamily="49" charset="0"/>
+              </a:rPr>
+              <a:t> write a function that accepts an array and a property and returns an array containing that property from each object.</a:t>
+            </a:r>
+          </a:p>
+          <a:p>
+            <a:pPr marL="0" indent="0">
+              <a:lnSpc>
+                <a:spcPct val="150000"/>
+              </a:lnSpc>
+              <a:buNone/>
+            </a:pPr>
+            <a:r>
+              <a:rPr lang="en-AU" sz="2800" b="1" dirty="0">
+                <a:latin typeface="Consolas" panose="020B0609020204030204" pitchFamily="49" charset="0"/>
+              </a:rPr>
+              <a:t>open</a:t>
+            </a:r>
+            <a:r>
+              <a:rPr lang="en-AU" sz="2800" dirty="0">
+                <a:latin typeface="Consolas" panose="020B0609020204030204" pitchFamily="49" charset="0"/>
+              </a:rPr>
+              <a:t> ./lib/problems/</a:t>
+            </a:r>
+            <a:r>
+              <a:rPr lang="en-AU" sz="2800" dirty="0" err="1">
+                <a:latin typeface="Consolas" panose="020B0609020204030204" pitchFamily="49" charset="0"/>
+              </a:rPr>
+              <a:t>pluck.ex</a:t>
+            </a:r>
+            <a:br>
+              <a:rPr lang="en-AU" sz="2800" dirty="0">
+                <a:latin typeface="Consolas" panose="020B0609020204030204" pitchFamily="49" charset="0"/>
+              </a:rPr>
+            </a:br>
+            <a:r>
+              <a:rPr lang="en-AU" sz="2800" b="1" dirty="0">
+                <a:latin typeface="Consolas" panose="020B0609020204030204" pitchFamily="49" charset="0"/>
+              </a:rPr>
+              <a:t>mix </a:t>
+            </a:r>
+            <a:r>
+              <a:rPr lang="en-AU" sz="2800" dirty="0">
+                <a:latin typeface="Consolas" panose="020B0609020204030204" pitchFamily="49" charset="0"/>
+              </a:rPr>
+              <a:t>test ./test/</a:t>
+            </a:r>
+            <a:r>
+              <a:rPr lang="en-AU" sz="2800" dirty="0" err="1">
+                <a:latin typeface="Consolas" panose="020B0609020204030204" pitchFamily="49" charset="0"/>
+              </a:rPr>
+              <a:t>pluck_test.exs</a:t>
+            </a:r>
+            <a:endParaRPr lang="en-AU" sz="2800" dirty="0">
+              <a:latin typeface="Consolas" panose="020B0609020204030204" pitchFamily="49" charset="0"/>
+            </a:endParaRPr>
+          </a:p>
+        </p:txBody>
+      </p:sp>
+    </p:spTree>
+    <p:extLst>
+      <p:ext uri="{BB962C8B-B14F-4D97-AF65-F5344CB8AC3E}">
+        <p14:creationId xmlns:p14="http://schemas.microsoft.com/office/powerpoint/2010/main" val="400214218"/>
+      </p:ext>
+    </p:extLst>
+  </p:cSld>
+  <p:clrMapOvr>
+    <a:masterClrMapping/>
+  </p:clrMapOvr>
+</p:sld>
+</file>
+
+<file path=ppt/slides/slide17.xml><?xml version="1.0" encoding="utf-8"?>
+<p:sld xmlns:a="http://schemas.openxmlformats.org/drawingml/2006/main" xmlns:r="http://schemas.openxmlformats.org/officeDocument/2006/relationships" xmlns:p="http://schemas.openxmlformats.org/presentationml/2006/main">
+  <p:cSld>
+    <p:spTree>
+      <p:nvGrpSpPr>
+        <p:cNvPr id="1" name=""/>
+        <p:cNvGrpSpPr/>
+        <p:nvPr/>
+      </p:nvGrpSpPr>
+      <p:grpSpPr>
+        <a:xfrm>
+          <a:off x="0" y="0"/>
+          <a:ext cx="0" cy="0"/>
+          <a:chOff x="0" y="0"/>
+          <a:chExt cx="0" cy="0"/>
+        </a:xfrm>
+      </p:grpSpPr>
+      <p:sp>
+        <p:nvSpPr>
+          <p:cNvPr id="2" name="Title 1">
+            <a:extLst>
+              <a:ext uri="{FF2B5EF4-FFF2-40B4-BE49-F238E27FC236}">
+                <a16:creationId xmlns:a16="http://schemas.microsoft.com/office/drawing/2014/main" id="{76B13826-DE95-4677-B994-11E01A706558}"/>
+              </a:ext>
+            </a:extLst>
+          </p:cNvPr>
+          <p:cNvSpPr>
+            <a:spLocks noGrp="1"/>
+          </p:cNvSpPr>
+          <p:nvPr>
+            <p:ph type="title"/>
+          </p:nvPr>
+        </p:nvSpPr>
+        <p:spPr/>
+        <p:txBody>
+          <a:bodyPr/>
+          <a:lstStyle/>
+          <a:p>
+            <a:r>
+              <a:rPr lang="en-AU" sz="6600" b="1" dirty="0">
+                <a:solidFill>
+                  <a:srgbClr val="000000"/>
+                </a:solidFill>
+                <a:latin typeface="Lato" panose="020F0502020204030203" pitchFamily="34" charset="0"/>
+              </a:rPr>
+              <a:t>Example:</a:t>
+            </a:r>
+            <a:r>
+              <a:rPr lang="en-AU" sz="6600" dirty="0">
+                <a:solidFill>
+                  <a:srgbClr val="000000"/>
+                </a:solidFill>
+                <a:latin typeface="Lato" panose="020F0502020204030203" pitchFamily="34" charset="0"/>
+              </a:rPr>
+              <a:t> unique</a:t>
+            </a:r>
+            <a:endParaRPr lang="en-AU" dirty="0"/>
+          </a:p>
+        </p:txBody>
+      </p:sp>
+      <p:sp>
+        <p:nvSpPr>
+          <p:cNvPr id="3" name="Content Placeholder 2">
+            <a:extLst>
+              <a:ext uri="{FF2B5EF4-FFF2-40B4-BE49-F238E27FC236}">
+                <a16:creationId xmlns:a16="http://schemas.microsoft.com/office/drawing/2014/main" id="{24BAB3FB-C3E8-4F40-8617-B66489B995DB}"/>
+              </a:ext>
+            </a:extLst>
+          </p:cNvPr>
+          <p:cNvSpPr>
+            <a:spLocks noGrp="1"/>
+          </p:cNvSpPr>
+          <p:nvPr>
+            <p:ph idx="1"/>
+          </p:nvPr>
+        </p:nvSpPr>
+        <p:spPr>
+          <a:xfrm>
+            <a:off x="1261872" y="2140903"/>
+            <a:ext cx="9692640" cy="4351337"/>
+          </a:xfrm>
+        </p:spPr>
+        <p:txBody>
+          <a:bodyPr>
+            <a:normAutofit/>
+          </a:bodyPr>
+          <a:lstStyle/>
+          <a:p>
+            <a:pPr marL="0" indent="0">
+              <a:lnSpc>
+                <a:spcPct val="150000"/>
+              </a:lnSpc>
+              <a:buNone/>
+            </a:pPr>
+            <a:r>
+              <a:rPr lang="en-AU" sz="2800" dirty="0">
+                <a:latin typeface="Consolas" panose="020B0609020204030204" pitchFamily="49" charset="0"/>
+              </a:rPr>
+              <a:t>Using </a:t>
+            </a:r>
+            <a:r>
+              <a:rPr lang="en-AU" sz="2800" dirty="0" err="1">
+                <a:latin typeface="Consolas" panose="020B0609020204030204" pitchFamily="49" charset="0"/>
+              </a:rPr>
+              <a:t>Enum.</a:t>
+            </a:r>
+            <a:r>
+              <a:rPr lang="en-AU" sz="2800" b="1" dirty="0" err="1">
+                <a:latin typeface="Consolas" panose="020B0609020204030204" pitchFamily="49" charset="0"/>
+              </a:rPr>
+              <a:t>reduce</a:t>
+            </a:r>
+            <a:r>
+              <a:rPr lang="en-AU" sz="2800" dirty="0">
+                <a:latin typeface="Consolas" panose="020B0609020204030204" pitchFamily="49" charset="0"/>
+              </a:rPr>
+              <a:t> write a function that accepts an array and returns an array with all duplicates removed.</a:t>
+            </a:r>
+          </a:p>
+          <a:p>
+            <a:pPr marL="0" indent="0">
+              <a:lnSpc>
+                <a:spcPct val="150000"/>
+              </a:lnSpc>
+              <a:buNone/>
+            </a:pPr>
+            <a:r>
+              <a:rPr lang="en-AU" sz="2800" b="1" dirty="0">
+                <a:latin typeface="Consolas" panose="020B0609020204030204" pitchFamily="49" charset="0"/>
+              </a:rPr>
+              <a:t>open</a:t>
+            </a:r>
+            <a:r>
+              <a:rPr lang="en-AU" sz="2800" dirty="0">
+                <a:latin typeface="Consolas" panose="020B0609020204030204" pitchFamily="49" charset="0"/>
+              </a:rPr>
+              <a:t> ./lib/problems/</a:t>
+            </a:r>
+            <a:r>
+              <a:rPr lang="en-AU" sz="2800" dirty="0" err="1">
+                <a:latin typeface="Consolas" panose="020B0609020204030204" pitchFamily="49" charset="0"/>
+              </a:rPr>
+              <a:t>unique.ex</a:t>
+            </a:r>
+            <a:br>
+              <a:rPr lang="en-AU" sz="2800" dirty="0">
+                <a:latin typeface="Consolas" panose="020B0609020204030204" pitchFamily="49" charset="0"/>
+              </a:rPr>
+            </a:br>
+            <a:r>
+              <a:rPr lang="en-AU" sz="2800" b="1" dirty="0">
+                <a:latin typeface="Consolas" panose="020B0609020204030204" pitchFamily="49" charset="0"/>
+              </a:rPr>
+              <a:t>mix </a:t>
+            </a:r>
+            <a:r>
+              <a:rPr lang="en-AU" sz="2800" dirty="0">
+                <a:latin typeface="Consolas" panose="020B0609020204030204" pitchFamily="49" charset="0"/>
+              </a:rPr>
+              <a:t>test ./test/</a:t>
+            </a:r>
+            <a:r>
+              <a:rPr lang="en-AU" sz="2800" dirty="0" err="1">
+                <a:latin typeface="Consolas" panose="020B0609020204030204" pitchFamily="49" charset="0"/>
+              </a:rPr>
+              <a:t>unique_test.exs</a:t>
+            </a:r>
+            <a:endParaRPr lang="en-AU" sz="2800" dirty="0">
+              <a:latin typeface="Consolas" panose="020B0609020204030204" pitchFamily="49" charset="0"/>
+            </a:endParaRPr>
+          </a:p>
+        </p:txBody>
+      </p:sp>
+    </p:spTree>
+    <p:extLst>
+      <p:ext uri="{BB962C8B-B14F-4D97-AF65-F5344CB8AC3E}">
+        <p14:creationId xmlns:p14="http://schemas.microsoft.com/office/powerpoint/2010/main" val="363491411"/>
+      </p:ext>
+    </p:extLst>
+  </p:cSld>
+  <p:clrMapOvr>
+    <a:masterClrMapping/>
+  </p:clrMapOvr>
+</p:sld>
+</file>
+
+<file path=ppt/slides/slide18.xml><?xml version="1.0" encoding="utf-8"?>
+<p:sld xmlns:a="http://schemas.openxmlformats.org/drawingml/2006/main" xmlns:r="http://schemas.openxmlformats.org/officeDocument/2006/relationships" xmlns:p="http://schemas.openxmlformats.org/presentationml/2006/main">
+  <p:cSld>
+    <p:spTree>
+      <p:nvGrpSpPr>
+        <p:cNvPr id="1" name=""/>
+        <p:cNvGrpSpPr/>
+        <p:nvPr/>
+      </p:nvGrpSpPr>
+      <p:grpSpPr>
+        <a:xfrm>
+          <a:off x="0" y="0"/>
+          <a:ext cx="0" cy="0"/>
+          <a:chOff x="0" y="0"/>
+          <a:chExt cx="0" cy="0"/>
+        </a:xfrm>
+      </p:grpSpPr>
+      <p:sp>
+        <p:nvSpPr>
+          <p:cNvPr id="2" name="Title 1">
+            <a:extLst>
+              <a:ext uri="{FF2B5EF4-FFF2-40B4-BE49-F238E27FC236}">
+                <a16:creationId xmlns:a16="http://schemas.microsoft.com/office/drawing/2014/main" id="{76B13826-DE95-4677-B994-11E01A706558}"/>
+              </a:ext>
+            </a:extLst>
+          </p:cNvPr>
+          <p:cNvSpPr>
+            <a:spLocks noGrp="1"/>
+          </p:cNvSpPr>
+          <p:nvPr>
+            <p:ph type="title"/>
+          </p:nvPr>
+        </p:nvSpPr>
+        <p:spPr/>
+        <p:txBody>
+          <a:bodyPr/>
+          <a:lstStyle/>
+          <a:p>
+            <a:r>
+              <a:rPr lang="en-AU" sz="6600" b="1" dirty="0">
+                <a:solidFill>
+                  <a:srgbClr val="000000"/>
+                </a:solidFill>
+                <a:latin typeface="Lato" panose="020F0502020204030203" pitchFamily="34" charset="0"/>
+              </a:rPr>
+              <a:t>Example:</a:t>
+            </a:r>
+            <a:r>
+              <a:rPr lang="en-AU" sz="6600" dirty="0">
+                <a:solidFill>
+                  <a:srgbClr val="000000"/>
+                </a:solidFill>
+                <a:latin typeface="Lato" panose="020F0502020204030203" pitchFamily="34" charset="0"/>
+              </a:rPr>
+              <a:t> match</a:t>
+            </a:r>
+            <a:endParaRPr lang="en-AU" dirty="0"/>
+          </a:p>
+        </p:txBody>
+      </p:sp>
+      <p:sp>
+        <p:nvSpPr>
+          <p:cNvPr id="3" name="Content Placeholder 2">
+            <a:extLst>
+              <a:ext uri="{FF2B5EF4-FFF2-40B4-BE49-F238E27FC236}">
+                <a16:creationId xmlns:a16="http://schemas.microsoft.com/office/drawing/2014/main" id="{24BAB3FB-C3E8-4F40-8617-B66489B995DB}"/>
+              </a:ext>
+            </a:extLst>
+          </p:cNvPr>
+          <p:cNvSpPr>
+            <a:spLocks noGrp="1"/>
+          </p:cNvSpPr>
+          <p:nvPr>
+            <p:ph idx="1"/>
+          </p:nvPr>
+        </p:nvSpPr>
+        <p:spPr>
+          <a:xfrm>
+            <a:off x="1261872" y="2140903"/>
+            <a:ext cx="9692640" cy="4351337"/>
+          </a:xfrm>
+        </p:spPr>
+        <p:txBody>
+          <a:bodyPr>
+            <a:noAutofit/>
+          </a:bodyPr>
+          <a:lstStyle/>
+          <a:p>
+            <a:pPr marL="0" indent="0">
+              <a:lnSpc>
+                <a:spcPct val="150000"/>
+              </a:lnSpc>
+              <a:buNone/>
+            </a:pPr>
+            <a:r>
+              <a:rPr lang="en-AU" sz="2800" dirty="0">
+                <a:latin typeface="Consolas" panose="020B0609020204030204" pitchFamily="49" charset="0"/>
+              </a:rPr>
+              <a:t>Using </a:t>
+            </a:r>
+            <a:r>
+              <a:rPr lang="en-AU" sz="2800" dirty="0" err="1">
+                <a:latin typeface="Consolas" panose="020B0609020204030204" pitchFamily="49" charset="0"/>
+              </a:rPr>
+              <a:t>Enum.</a:t>
+            </a:r>
+            <a:r>
+              <a:rPr lang="en-AU" sz="2800" b="1" dirty="0" err="1">
+                <a:latin typeface="Consolas" panose="020B0609020204030204" pitchFamily="49" charset="0"/>
+              </a:rPr>
+              <a:t>filter</a:t>
+            </a:r>
+            <a:r>
+              <a:rPr lang="en-AU" sz="2800" dirty="0">
+                <a:latin typeface="Consolas" panose="020B0609020204030204" pitchFamily="49" charset="0"/>
+              </a:rPr>
+              <a:t> write a function that accepts an array of objects and a property (key-value pair) and returns an array of all objects that match the given property.</a:t>
+            </a:r>
+          </a:p>
+          <a:p>
+            <a:pPr marL="0" indent="0">
+              <a:lnSpc>
+                <a:spcPct val="150000"/>
+              </a:lnSpc>
+              <a:buNone/>
+            </a:pPr>
+            <a:r>
+              <a:rPr lang="en-AU" sz="2800" b="1" dirty="0">
+                <a:latin typeface="Consolas" panose="020B0609020204030204" pitchFamily="49" charset="0"/>
+              </a:rPr>
+              <a:t>open</a:t>
+            </a:r>
+            <a:r>
+              <a:rPr lang="en-AU" sz="2800" dirty="0">
+                <a:latin typeface="Consolas" panose="020B0609020204030204" pitchFamily="49" charset="0"/>
+              </a:rPr>
+              <a:t> ./lib/problems/</a:t>
+            </a:r>
+            <a:r>
+              <a:rPr lang="en-AU" sz="2800" dirty="0" err="1">
+                <a:latin typeface="Consolas" panose="020B0609020204030204" pitchFamily="49" charset="0"/>
+              </a:rPr>
+              <a:t>match.ex</a:t>
+            </a:r>
+            <a:br>
+              <a:rPr lang="en-AU" sz="2800" dirty="0">
+                <a:latin typeface="Consolas" panose="020B0609020204030204" pitchFamily="49" charset="0"/>
+              </a:rPr>
+            </a:br>
+            <a:r>
+              <a:rPr lang="en-AU" sz="2800" b="1" dirty="0">
+                <a:latin typeface="Consolas" panose="020B0609020204030204" pitchFamily="49" charset="0"/>
+              </a:rPr>
+              <a:t>mix </a:t>
+            </a:r>
+            <a:r>
+              <a:rPr lang="en-AU" sz="2800" dirty="0">
+                <a:latin typeface="Consolas" panose="020B0609020204030204" pitchFamily="49" charset="0"/>
+              </a:rPr>
+              <a:t>test ./test/</a:t>
+            </a:r>
+            <a:r>
+              <a:rPr lang="en-AU" sz="2800" dirty="0" err="1">
+                <a:latin typeface="Consolas" panose="020B0609020204030204" pitchFamily="49" charset="0"/>
+              </a:rPr>
+              <a:t>match_test.exs</a:t>
+            </a:r>
+            <a:endParaRPr lang="en-AU" sz="2800" dirty="0">
+              <a:latin typeface="Consolas" panose="020B0609020204030204" pitchFamily="49" charset="0"/>
+            </a:endParaRPr>
+          </a:p>
+        </p:txBody>
+      </p:sp>
+    </p:spTree>
+    <p:extLst>
+      <p:ext uri="{BB962C8B-B14F-4D97-AF65-F5344CB8AC3E}">
+        <p14:creationId xmlns:p14="http://schemas.microsoft.com/office/powerpoint/2010/main" val="383503952"/>
+      </p:ext>
+    </p:extLst>
+  </p:cSld>
+  <p:clrMapOvr>
+    <a:masterClrMapping/>
+  </p:clrMapOvr>
+</p:sld>
+</file>
+
+<file path=ppt/slides/slide19.xml><?xml version="1.0" encoding="utf-8"?>
+<p:sld xmlns:a="http://schemas.openxmlformats.org/drawingml/2006/main" xmlns:r="http://schemas.openxmlformats.org/officeDocument/2006/relationships" xmlns:p="http://schemas.openxmlformats.org/presentationml/2006/main">
+  <p:cSld>
+    <p:spTree>
+      <p:nvGrpSpPr>
+        <p:cNvPr id="1" name=""/>
+        <p:cNvGrpSpPr/>
+        <p:nvPr/>
+      </p:nvGrpSpPr>
+      <p:grpSpPr>
+        <a:xfrm>
+          <a:off x="0" y="0"/>
+          <a:ext cx="0" cy="0"/>
+          <a:chOff x="0" y="0"/>
+          <a:chExt cx="0" cy="0"/>
+        </a:xfrm>
+      </p:grpSpPr>
+      <p:sp>
+        <p:nvSpPr>
+          <p:cNvPr id="2" name="Title 1">
+            <a:extLst>
+              <a:ext uri="{FF2B5EF4-FFF2-40B4-BE49-F238E27FC236}">
+                <a16:creationId xmlns:a16="http://schemas.microsoft.com/office/drawing/2014/main" id="{76B13826-DE95-4677-B994-11E01A706558}"/>
+              </a:ext>
+            </a:extLst>
+          </p:cNvPr>
+          <p:cNvSpPr>
+            <a:spLocks noGrp="1"/>
+          </p:cNvSpPr>
+          <p:nvPr>
+            <p:ph type="title"/>
+          </p:nvPr>
+        </p:nvSpPr>
+        <p:spPr/>
+        <p:txBody>
+          <a:bodyPr/>
+          <a:lstStyle/>
+          <a:p>
+            <a:r>
+              <a:rPr lang="en-AU" sz="6600" b="1" dirty="0">
+                <a:solidFill>
+                  <a:srgbClr val="000000"/>
+                </a:solidFill>
+                <a:latin typeface="Lato" panose="020F0502020204030203" pitchFamily="34" charset="0"/>
+              </a:rPr>
+              <a:t>Example:</a:t>
+            </a:r>
+            <a:r>
+              <a:rPr lang="en-AU" sz="6600" dirty="0">
+                <a:solidFill>
+                  <a:srgbClr val="000000"/>
+                </a:solidFill>
+                <a:latin typeface="Lato" panose="020F0502020204030203" pitchFamily="34" charset="0"/>
+              </a:rPr>
+              <a:t> batsmen</a:t>
+            </a:r>
+            <a:endParaRPr lang="en-AU" dirty="0"/>
+          </a:p>
+        </p:txBody>
+      </p:sp>
+      <p:sp>
+        <p:nvSpPr>
+          <p:cNvPr id="3" name="Content Placeholder 2">
+            <a:extLst>
+              <a:ext uri="{FF2B5EF4-FFF2-40B4-BE49-F238E27FC236}">
+                <a16:creationId xmlns:a16="http://schemas.microsoft.com/office/drawing/2014/main" id="{24BAB3FB-C3E8-4F40-8617-B66489B995DB}"/>
+              </a:ext>
+            </a:extLst>
+          </p:cNvPr>
+          <p:cNvSpPr>
+            <a:spLocks noGrp="1"/>
+          </p:cNvSpPr>
+          <p:nvPr>
+            <p:ph idx="1"/>
+          </p:nvPr>
+        </p:nvSpPr>
+        <p:spPr>
+          <a:xfrm>
+            <a:off x="1261872" y="2140903"/>
+            <a:ext cx="9692640" cy="4351337"/>
+          </a:xfrm>
+        </p:spPr>
+        <p:txBody>
+          <a:bodyPr>
+            <a:noAutofit/>
+          </a:bodyPr>
+          <a:lstStyle/>
+          <a:p>
+            <a:pPr marL="0" indent="0">
+              <a:buNone/>
+            </a:pPr>
+            <a:r>
+              <a:rPr lang="en-AU" sz="2800" dirty="0">
                 <a:latin typeface="Consolas" panose="020B0609020204030204" pitchFamily="49" charset="0"/>
               </a:rPr>
               <a:t>Read in batsmen from a file and convert </a:t>
             </a:r>
             <a:br>
-              <a:rPr lang="en-AU" sz="3000" dirty="0">
+              <a:rPr lang="en-AU" sz="2800" dirty="0">
                 <a:latin typeface="Consolas" panose="020B0609020204030204" pitchFamily="49" charset="0"/>
               </a:rPr>
             </a:br>
             <a:r>
-              <a:rPr lang="en-AU" sz="3000" dirty="0">
+              <a:rPr lang="en-AU" sz="2800" dirty="0">
                 <a:latin typeface="Consolas" panose="020B0609020204030204" pitchFamily="49" charset="0"/>
               </a:rPr>
               <a:t>them into a list of objects with initials, surnames, runs, and averages.</a:t>
@@ -5107,19 +5786,19 @@
               <a:buNone/>
             </a:pPr>
             <a:r>
-              <a:rPr lang="en-AU" sz="3000" dirty="0">
+              <a:rPr lang="en-AU" sz="2800" dirty="0">
                 <a:latin typeface="Consolas" panose="020B0609020204030204" pitchFamily="49" charset="0"/>
               </a:rPr>
               <a:t>Round averages to the nearest integer, sort batsmen in </a:t>
             </a:r>
             <a:r>
-              <a:rPr lang="en-AU" sz="3000" dirty="0" err="1">
+              <a:rPr lang="en-AU" sz="2800" dirty="0" err="1">
                 <a:latin typeface="Consolas" panose="020B0609020204030204" pitchFamily="49" charset="0"/>
               </a:rPr>
               <a:t>desc</a:t>
             </a:r>
             <a:r>
-              <a:rPr lang="en-AU" sz="3000" dirty="0">
+              <a:rPr lang="en-AU" sz="2800" dirty="0">
                 <a:latin typeface="Consolas" panose="020B0609020204030204" pitchFamily="49" charset="0"/>
               </a:rPr>
               <a:t> order by total runs and filter for surnames that start with C.</a:t>
@@ -5130,47 +5809,47 @@
               <a:buNone/>
             </a:pPr>
             <a:r>
-              <a:rPr lang="en-AU" sz="3000" b="1" dirty="0">
+              <a:rPr lang="en-AU" sz="2800" b="1" dirty="0">
                 <a:latin typeface="Consolas" panose="020B0609020204030204" pitchFamily="49" charset="0"/>
               </a:rPr>
               <a:t>open</a:t>
             </a:r>
             <a:r>
-              <a:rPr lang="en-AU" sz="3000" dirty="0">
-                <a:latin typeface="Consolas" panose="020B0609020204030204" pitchFamily="49" charset="0"/>
-              </a:rPr>
-              <a:t> ./problems/</a:t>
-            </a:r>
-            <a:r>
-              <a:rPr lang="en-AU" sz="3000" dirty="0" err="1">
-                <a:latin typeface="Consolas" panose="020B0609020204030204" pitchFamily="49" charset="0"/>
-              </a:rPr>
-              <a:t>batsmen.exs</a:t>
+              <a:rPr lang="en-AU" sz="2800" dirty="0">
+                <a:latin typeface="Consolas" panose="020B0609020204030204" pitchFamily="49" charset="0"/>
+              </a:rPr>
+              <a:t> ./lib/problems/</a:t>
+            </a:r>
+            <a:r>
+              <a:rPr lang="en-AU" sz="2800" dirty="0" err="1">
+                <a:latin typeface="Consolas" panose="020B0609020204030204" pitchFamily="49" charset="0"/>
+              </a:rPr>
+              <a:t>batsmen.ex</a:t>
             </a:r>
             <a:br>
-              <a:rPr lang="en-AU" sz="3000" dirty="0">
+              <a:rPr lang="en-AU" sz="2800" dirty="0">
                 <a:latin typeface="Consolas" panose="020B0609020204030204" pitchFamily="49" charset="0"/>
               </a:rPr>
             </a:br>
             <a:r>
-              <a:rPr lang="en-AU" sz="3000" b="1" dirty="0">
-                <a:latin typeface="Consolas" panose="020B0609020204030204" pitchFamily="49" charset="0"/>
-              </a:rPr>
-              <a:t>elixir</a:t>
-            </a:r>
-            <a:r>
-              <a:rPr lang="en-AU" sz="3000" dirty="0">
-                <a:latin typeface="Consolas" panose="020B0609020204030204" pitchFamily="49" charset="0"/>
-              </a:rPr>
-              <a:t> problems/</a:t>
-            </a:r>
-            <a:r>
-              <a:rPr lang="en-AU" sz="3000" dirty="0" err="1">
-                <a:latin typeface="Consolas" panose="020B0609020204030204" pitchFamily="49" charset="0"/>
-              </a:rPr>
-              <a:t>batsmen.exs</a:t>
-            </a:r>
-            <a:endParaRPr lang="en-AU" sz="3000" dirty="0">
+              <a:rPr lang="en-AU" sz="2800" b="1" dirty="0">
+                <a:latin typeface="Consolas" panose="020B0609020204030204" pitchFamily="49" charset="0"/>
+              </a:rPr>
+              <a:t>mix </a:t>
+            </a:r>
+            <a:r>
+              <a:rPr lang="en-AU" sz="2800" dirty="0">
+                <a:latin typeface="Consolas" panose="020B0609020204030204" pitchFamily="49" charset="0"/>
+              </a:rPr>
+              <a:t>test test/</a:t>
+            </a:r>
+            <a:r>
+              <a:rPr lang="en-AU" sz="2800" dirty="0" err="1">
+                <a:latin typeface="Consolas" panose="020B0609020204030204" pitchFamily="49" charset="0"/>
+              </a:rPr>
+              <a:t>batsmen_test.exs</a:t>
+            </a:r>
+            <a:endParaRPr lang="en-AU" sz="2800" dirty="0">
               <a:latin typeface="Consolas" panose="020B0609020204030204" pitchFamily="49" charset="0"/>
             </a:endParaRPr>
           </a:p>
@@ -5340,6 +6019,367 @@
 </p:sld>
 </file>
 
+<file path=ppt/slides/slide20.xml><?xml version="1.0" encoding="utf-8"?>
+<p:sld xmlns:a="http://schemas.openxmlformats.org/drawingml/2006/main" xmlns:r="http://schemas.openxmlformats.org/officeDocument/2006/relationships" xmlns:p="http://schemas.openxmlformats.org/presentationml/2006/main">
+  <p:cSld>
+    <p:spTree>
+      <p:nvGrpSpPr>
+        <p:cNvPr id="1" name=""/>
+        <p:cNvGrpSpPr/>
+        <p:nvPr/>
+      </p:nvGrpSpPr>
+      <p:grpSpPr>
+        <a:xfrm>
+          <a:off x="0" y="0"/>
+          <a:ext cx="0" cy="0"/>
+          <a:chOff x="0" y="0"/>
+          <a:chExt cx="0" cy="0"/>
+        </a:xfrm>
+      </p:grpSpPr>
+      <p:sp>
+        <p:nvSpPr>
+          <p:cNvPr id="2" name="Title 1">
+            <a:extLst>
+              <a:ext uri="{FF2B5EF4-FFF2-40B4-BE49-F238E27FC236}">
+                <a16:creationId xmlns:a16="http://schemas.microsoft.com/office/drawing/2014/main" id="{76B13826-DE95-4677-B994-11E01A706558}"/>
+              </a:ext>
+            </a:extLst>
+          </p:cNvPr>
+          <p:cNvSpPr>
+            <a:spLocks noGrp="1"/>
+          </p:cNvSpPr>
+          <p:nvPr>
+            <p:ph type="title"/>
+          </p:nvPr>
+        </p:nvSpPr>
+        <p:spPr/>
+        <p:txBody>
+          <a:bodyPr>
+            <a:normAutofit fontScale="90000"/>
+          </a:bodyPr>
+          <a:lstStyle/>
+          <a:p>
+            <a:r>
+              <a:rPr lang="en-AU" sz="6600" b="1" dirty="0">
+                <a:solidFill>
+                  <a:srgbClr val="000000"/>
+                </a:solidFill>
+                <a:latin typeface="Lato" panose="020F0502020204030203" pitchFamily="34" charset="0"/>
+              </a:rPr>
+              <a:t>Example: </a:t>
+            </a:r>
+            <a:r>
+              <a:rPr lang="en-AU" sz="6600" dirty="0">
+                <a:solidFill>
+                  <a:srgbClr val="000000"/>
+                </a:solidFill>
+                <a:latin typeface="Lato" panose="020F0502020204030203" pitchFamily="34" charset="0"/>
+              </a:rPr>
+              <a:t>nucleotide_count</a:t>
+            </a:r>
+            <a:endParaRPr lang="en-AU" dirty="0"/>
+          </a:p>
+        </p:txBody>
+      </p:sp>
+      <p:sp>
+        <p:nvSpPr>
+          <p:cNvPr id="3" name="Content Placeholder 2">
+            <a:extLst>
+              <a:ext uri="{FF2B5EF4-FFF2-40B4-BE49-F238E27FC236}">
+                <a16:creationId xmlns:a16="http://schemas.microsoft.com/office/drawing/2014/main" id="{24BAB3FB-C3E8-4F40-8617-B66489B995DB}"/>
+              </a:ext>
+            </a:extLst>
+          </p:cNvPr>
+          <p:cNvSpPr>
+            <a:spLocks noGrp="1"/>
+          </p:cNvSpPr>
+          <p:nvPr>
+            <p:ph idx="1"/>
+          </p:nvPr>
+        </p:nvSpPr>
+        <p:spPr>
+          <a:xfrm>
+            <a:off x="1261872" y="2140903"/>
+            <a:ext cx="9692640" cy="4351337"/>
+          </a:xfrm>
+        </p:spPr>
+        <p:txBody>
+          <a:bodyPr>
+            <a:noAutofit/>
+          </a:bodyPr>
+          <a:lstStyle/>
+          <a:p>
+            <a:pPr marL="0" indent="0">
+              <a:lnSpc>
+                <a:spcPct val="150000"/>
+              </a:lnSpc>
+              <a:buNone/>
+            </a:pPr>
+            <a:r>
+              <a:rPr lang="en-AU" sz="2800" dirty="0">
+                <a:latin typeface="Consolas" panose="020B0609020204030204" pitchFamily="49" charset="0"/>
+              </a:rPr>
+              <a:t>Given a DNA string, compute how many times each nucleotide occurs in the string. DNA is represented by an alphabet of the following nucleotides: 'A', 'C', 'G','T’.</a:t>
+            </a:r>
+          </a:p>
+          <a:p>
+            <a:pPr marL="0" indent="0">
+              <a:lnSpc>
+                <a:spcPct val="150000"/>
+              </a:lnSpc>
+              <a:buNone/>
+            </a:pPr>
+            <a:r>
+              <a:rPr lang="en-AU" sz="2800" b="1" dirty="0">
+                <a:latin typeface="Consolas" panose="020B0609020204030204" pitchFamily="49" charset="0"/>
+              </a:rPr>
+              <a:t>open</a:t>
+            </a:r>
+            <a:r>
+              <a:rPr lang="en-AU" sz="2800" dirty="0">
+                <a:latin typeface="Consolas" panose="020B0609020204030204" pitchFamily="49" charset="0"/>
+              </a:rPr>
+              <a:t> ./lib/problems/</a:t>
+            </a:r>
+            <a:r>
+              <a:rPr lang="en-AU" sz="2800" dirty="0" err="1">
+                <a:latin typeface="Consolas" panose="020B0609020204030204" pitchFamily="49" charset="0"/>
+              </a:rPr>
+              <a:t>nucleotide_count.ex</a:t>
+            </a:r>
+            <a:br>
+              <a:rPr lang="en-AU" sz="2800" dirty="0">
+                <a:latin typeface="Consolas" panose="020B0609020204030204" pitchFamily="49" charset="0"/>
+              </a:rPr>
+            </a:br>
+            <a:r>
+              <a:rPr lang="en-AU" sz="2800" b="1" dirty="0">
+                <a:latin typeface="Consolas" panose="020B0609020204030204" pitchFamily="49" charset="0"/>
+              </a:rPr>
+              <a:t>mix</a:t>
+            </a:r>
+            <a:r>
+              <a:rPr lang="en-AU" sz="2800" dirty="0">
+                <a:latin typeface="Consolas" panose="020B0609020204030204" pitchFamily="49" charset="0"/>
+              </a:rPr>
+              <a:t> test test/</a:t>
+            </a:r>
+            <a:r>
+              <a:rPr lang="en-AU" sz="2800" dirty="0" err="1">
+                <a:latin typeface="Consolas" panose="020B0609020204030204" pitchFamily="49" charset="0"/>
+              </a:rPr>
+              <a:t>nucleotide_count_test.exs</a:t>
+            </a:r>
+            <a:endParaRPr lang="en-AU" sz="2800" b="1" dirty="0">
+              <a:latin typeface="Consolas" panose="020B0609020204030204" pitchFamily="49" charset="0"/>
+            </a:endParaRPr>
+          </a:p>
+        </p:txBody>
+      </p:sp>
+    </p:spTree>
+    <p:extLst>
+      <p:ext uri="{BB962C8B-B14F-4D97-AF65-F5344CB8AC3E}">
+        <p14:creationId xmlns:p14="http://schemas.microsoft.com/office/powerpoint/2010/main" val="3088502034"/>
+      </p:ext>
+    </p:extLst>
+  </p:cSld>
+  <p:clrMapOvr>
+    <a:masterClrMapping/>
+  </p:clrMapOvr>
+</p:sld>
+</file>
+
+<file path=ppt/slides/slide21.xml><?xml version="1.0" encoding="utf-8"?>
+<p:sld xmlns:a="http://schemas.openxmlformats.org/drawingml/2006/main" xmlns:r="http://schemas.openxmlformats.org/officeDocument/2006/relationships" xmlns:p="http://schemas.openxmlformats.org/presentationml/2006/main">
+  <p:cSld>
+    <p:spTree>
+      <p:nvGrpSpPr>
+        <p:cNvPr id="1" name=""/>
+        <p:cNvGrpSpPr/>
+        <p:nvPr/>
+      </p:nvGrpSpPr>
+      <p:grpSpPr>
+        <a:xfrm>
+          <a:off x="0" y="0"/>
+          <a:ext cx="0" cy="0"/>
+          <a:chOff x="0" y="0"/>
+          <a:chExt cx="0" cy="0"/>
+        </a:xfrm>
+      </p:grpSpPr>
+      <p:sp>
+        <p:nvSpPr>
+          <p:cNvPr id="2" name="Title 1">
+            <a:extLst>
+              <a:ext uri="{FF2B5EF4-FFF2-40B4-BE49-F238E27FC236}">
+                <a16:creationId xmlns:a16="http://schemas.microsoft.com/office/drawing/2014/main" id="{76B13826-DE95-4677-B994-11E01A706558}"/>
+              </a:ext>
+            </a:extLst>
+          </p:cNvPr>
+          <p:cNvSpPr>
+            <a:spLocks noGrp="1"/>
+          </p:cNvSpPr>
+          <p:nvPr>
+            <p:ph type="title"/>
+          </p:nvPr>
+        </p:nvSpPr>
+        <p:spPr/>
+        <p:txBody>
+          <a:bodyPr>
+            <a:normAutofit fontScale="90000"/>
+          </a:bodyPr>
+          <a:lstStyle/>
+          <a:p>
+            <a:r>
+              <a:rPr lang="en-AU" sz="6600" b="1" dirty="0">
+                <a:solidFill>
+                  <a:srgbClr val="000000"/>
+                </a:solidFill>
+                <a:latin typeface="Lato" panose="020F0502020204030203" pitchFamily="34" charset="0"/>
+              </a:rPr>
+              <a:t>Example:</a:t>
+            </a:r>
+            <a:r>
+              <a:rPr lang="en-AU" sz="6600" dirty="0">
+                <a:solidFill>
+                  <a:srgbClr val="000000"/>
+                </a:solidFill>
+                <a:latin typeface="Lato" panose="020F0502020204030203" pitchFamily="34" charset="0"/>
+              </a:rPr>
+              <a:t> </a:t>
+            </a:r>
+            <a:r>
+              <a:rPr lang="en-AU" sz="6600" dirty="0" err="1">
+                <a:solidFill>
+                  <a:srgbClr val="000000"/>
+                </a:solidFill>
+                <a:latin typeface="Lato" panose="020F0502020204030203" pitchFamily="34" charset="0"/>
+              </a:rPr>
+              <a:t>secret_handshake</a:t>
+            </a:r>
+            <a:endParaRPr lang="en-AU" dirty="0"/>
+          </a:p>
+        </p:txBody>
+      </p:sp>
+      <p:sp>
+        <p:nvSpPr>
+          <p:cNvPr id="3" name="Content Placeholder 2">
+            <a:extLst>
+              <a:ext uri="{FF2B5EF4-FFF2-40B4-BE49-F238E27FC236}">
+                <a16:creationId xmlns:a16="http://schemas.microsoft.com/office/drawing/2014/main" id="{24BAB3FB-C3E8-4F40-8617-B66489B995DB}"/>
+              </a:ext>
+            </a:extLst>
+          </p:cNvPr>
+          <p:cNvSpPr>
+            <a:spLocks noGrp="1"/>
+          </p:cNvSpPr>
+          <p:nvPr>
+            <p:ph idx="1"/>
+          </p:nvPr>
+        </p:nvSpPr>
+        <p:spPr>
+          <a:xfrm>
+            <a:off x="1261872" y="2140903"/>
+            <a:ext cx="9692640" cy="4351337"/>
+          </a:xfrm>
+        </p:spPr>
+        <p:txBody>
+          <a:bodyPr>
+            <a:normAutofit/>
+          </a:bodyPr>
+          <a:lstStyle/>
+          <a:p>
+            <a:pPr marL="0" indent="0">
+              <a:lnSpc>
+                <a:spcPct val="150000"/>
+              </a:lnSpc>
+              <a:buNone/>
+            </a:pPr>
+            <a:r>
+              <a:rPr lang="en-AU" sz="2800" dirty="0">
+                <a:latin typeface="Consolas" panose="020B0609020204030204" pitchFamily="49" charset="0"/>
+              </a:rPr>
+              <a:t>Given a decimal number, convert it to binary and then to the appropriate sequence of events for a secret handshake.</a:t>
+            </a:r>
+          </a:p>
+          <a:p>
+            <a:pPr marL="0" indent="0">
+              <a:lnSpc>
+                <a:spcPct val="150000"/>
+              </a:lnSpc>
+              <a:buNone/>
+            </a:pPr>
+            <a:r>
+              <a:rPr lang="en-AU" sz="2800" b="1" dirty="0">
+                <a:latin typeface="Consolas" panose="020B0609020204030204" pitchFamily="49" charset="0"/>
+              </a:rPr>
+              <a:t>open</a:t>
+            </a:r>
+            <a:r>
+              <a:rPr lang="en-AU" sz="2800" dirty="0">
+                <a:latin typeface="Consolas" panose="020B0609020204030204" pitchFamily="49" charset="0"/>
+              </a:rPr>
+              <a:t> ./lib/problems/</a:t>
+            </a:r>
+            <a:r>
+              <a:rPr lang="en-AU" sz="2800" dirty="0" err="1">
+                <a:latin typeface="Consolas" panose="020B0609020204030204" pitchFamily="49" charset="0"/>
+              </a:rPr>
+              <a:t>secret_handshake.ex</a:t>
+            </a:r>
+            <a:br>
+              <a:rPr lang="en-AU" sz="2800" dirty="0">
+                <a:latin typeface="Consolas" panose="020B0609020204030204" pitchFamily="49" charset="0"/>
+              </a:rPr>
+            </a:br>
+            <a:r>
+              <a:rPr lang="en-AU" sz="2800" b="1" dirty="0">
+                <a:latin typeface="Consolas" panose="020B0609020204030204" pitchFamily="49" charset="0"/>
+              </a:rPr>
+              <a:t>mix </a:t>
+            </a:r>
+            <a:r>
+              <a:rPr lang="en-AU" sz="2800" dirty="0">
+                <a:latin typeface="Consolas" panose="020B0609020204030204" pitchFamily="49" charset="0"/>
+              </a:rPr>
+              <a:t>test</a:t>
+            </a:r>
+            <a:r>
+              <a:rPr lang="en-AU" sz="2800" b="1" dirty="0">
+                <a:latin typeface="Consolas" panose="020B0609020204030204" pitchFamily="49" charset="0"/>
+              </a:rPr>
+              <a:t> </a:t>
+            </a:r>
+            <a:r>
+              <a:rPr lang="en-AU" sz="2800" dirty="0">
+                <a:latin typeface="Consolas" panose="020B0609020204030204" pitchFamily="49" charset="0"/>
+              </a:rPr>
+              <a:t>test/</a:t>
+            </a:r>
+            <a:r>
+              <a:rPr lang="en-AU" sz="2800" dirty="0" err="1">
+                <a:latin typeface="Consolas" panose="020B0609020204030204" pitchFamily="49" charset="0"/>
+              </a:rPr>
+              <a:t>secret_handshake_test.exs</a:t>
+            </a:r>
+            <a:endParaRPr lang="en-AU" sz="2800" b="1" dirty="0">
+              <a:latin typeface="Consolas" panose="020B0609020204030204" pitchFamily="49" charset="0"/>
+            </a:endParaRPr>
+          </a:p>
+        </p:txBody>
+      </p:sp>
+    </p:spTree>
+    <p:extLst>
+      <p:ext uri="{BB962C8B-B14F-4D97-AF65-F5344CB8AC3E}">
+        <p14:creationId xmlns:p14="http://schemas.microsoft.com/office/powerpoint/2010/main" val="2007551810"/>
+      </p:ext>
+    </p:extLst>
+  </p:cSld>
+  <p:clrMapOvr>
+    <a:masterClrMapping/>
+  </p:clrMapOvr>
+</p:sld>
+</file>
+
 <file path=ppt/slides/slide3.xml><?xml version="1.0" encoding="utf-8"?>
 <p:sld xmlns:a="http://schemas.openxmlformats.org/drawingml/2006/main" xmlns:r="http://schemas.openxmlformats.org/officeDocument/2006/relationships" xmlns:p="http://schemas.openxmlformats.org/presentationml/2006/main">
   <p:cSld>
@@ -5421,58 +6461,58 @@
               <a:buNone/>
             </a:pPr>
             <a:r>
-              <a:rPr lang="en-AU" sz="4000" b="1" dirty="0">
+              <a:rPr lang="en-AU" sz="4400" b="1" dirty="0">
                 <a:latin typeface="Consolas" panose="020B0609020204030204" pitchFamily="49" charset="0"/>
               </a:rPr>
               <a:t>git </a:t>
             </a:r>
             <a:r>
-              <a:rPr lang="en-AU" sz="4000" dirty="0">
+              <a:rPr lang="en-AU" sz="4400" dirty="0">
                 <a:latin typeface="Consolas" panose="020B0609020204030204" pitchFamily="49" charset="0"/>
               </a:rPr>
               <a:t>clone</a:t>
             </a:r>
             <a:r>
-              <a:rPr lang="en-AU" sz="4000" b="1" dirty="0">
+              <a:rPr lang="en-AU" sz="4400" b="1" dirty="0">
                 <a:latin typeface="Consolas" panose="020B0609020204030204" pitchFamily="49" charset="0"/>
               </a:rPr>
               <a:t> </a:t>
             </a:r>
             <a:r>
-              <a:rPr lang="en-AU" sz="4000" u="sng" dirty="0">
+              <a:rPr lang="en-AU" sz="4400" u="sng" dirty="0">
                 <a:latin typeface="Consolas" panose="020B0609020204030204" pitchFamily="49" charset="0"/>
                 <a:hlinkClick r:id="rId2"/>
               </a:rPr>
               <a:t>https://github.com/</a:t>
             </a:r>
             <a:br>
-              <a:rPr lang="en-AU" sz="4000" u="sng" dirty="0">
+              <a:rPr lang="en-AU" sz="4400" u="sng" dirty="0">
                 <a:latin typeface="Consolas" panose="020B0609020204030204" pitchFamily="49" charset="0"/>
                 <a:hlinkClick r:id="rId2"/>
               </a:rPr>
             </a:br>
             <a:r>
-              <a:rPr lang="en-AU" sz="4000" u="sng" dirty="0" err="1">
+              <a:rPr lang="en-AU" sz="4400" u="sng" dirty="0" err="1">
                 <a:latin typeface="Consolas" panose="020B0609020204030204" pitchFamily="49" charset="0"/>
                 <a:hlinkClick r:id="rId2"/>
               </a:rPr>
               <a:t>fp-uwa</a:t>
             </a:r>
             <a:r>
-              <a:rPr lang="en-AU" sz="4000" u="sng" dirty="0">
+              <a:rPr lang="en-AU" sz="4400" u="sng" dirty="0">
                 <a:latin typeface="Consolas" panose="020B0609020204030204" pitchFamily="49" charset="0"/>
                 <a:hlinkClick r:id="rId2"/>
               </a:rPr>
               <a:t>/intro-</a:t>
             </a:r>
             <a:r>
-              <a:rPr lang="en-AU" sz="4000" u="sng" dirty="0" err="1">
+              <a:rPr lang="en-AU" sz="4400" u="sng" dirty="0" err="1">
                 <a:latin typeface="Consolas" panose="020B0609020204030204" pitchFamily="49" charset="0"/>
                 <a:hlinkClick r:id="rId2"/>
               </a:rPr>
               <a:t>elixir.git</a:t>
             </a:r>
-            <a:endParaRPr lang="en-AU" sz="4000" u="sng" dirty="0">
+            <a:endParaRPr lang="en-AU" sz="4400" u="sng" dirty="0">
               <a:latin typeface="Consolas" panose="020B0609020204030204" pitchFamily="49" charset="0"/>
             </a:endParaRPr>
           </a:p>
@@ -5481,18 +6521,18 @@
               <a:buNone/>
             </a:pPr>
             <a:r>
-              <a:rPr lang="en-AU" sz="4000" b="1" dirty="0">
+              <a:rPr lang="en-AU" sz="4400" b="1" dirty="0">
                 <a:latin typeface="Consolas" panose="020B0609020204030204" pitchFamily="49" charset="0"/>
               </a:rPr>
               <a:t>cd </a:t>
             </a:r>
             <a:r>
-              <a:rPr lang="en-AU" sz="4000" dirty="0">
-                <a:latin typeface="Consolas" panose="020B0609020204030204" pitchFamily="49" charset="0"/>
-              </a:rPr>
-              <a:t>intro-elixir</a:t>
-            </a:r>
-            <a:endParaRPr lang="en-AU" sz="4000" b="1" dirty="0">
+              <a:rPr lang="en-AU" sz="4400" dirty="0">
+                <a:latin typeface="Consolas" panose="020B0609020204030204" pitchFamily="49" charset="0"/>
+              </a:rPr>
+              <a:t>intro-elixir/examples</a:t>
+            </a:r>
+            <a:endParaRPr lang="en-AU" sz="4400" b="1" dirty="0">
               <a:latin typeface="Consolas" panose="020B0609020204030204" pitchFamily="49" charset="0"/>
             </a:endParaRPr>
           </a:p>
@@ -5501,32 +6541,17 @@
               <a:buNone/>
             </a:pPr>
             <a:r>
-              <a:rPr lang="en-AU" sz="4000" b="1" dirty="0">
-                <a:latin typeface="Consolas" panose="020B0609020204030204" pitchFamily="49" charset="0"/>
-              </a:rPr>
-              <a:t>elixir </a:t>
-            </a:r>
-            <a:r>
-              <a:rPr lang="en-AU" sz="4000" dirty="0">
-                <a:latin typeface="Consolas" panose="020B0609020204030204" pitchFamily="49" charset="0"/>
-              </a:rPr>
-              <a:t>problems/</a:t>
-            </a:r>
-            <a:r>
-              <a:rPr lang="en-AU" sz="4000" i="1" dirty="0">
-                <a:latin typeface="Consolas" panose="020B0609020204030204" pitchFamily="49" charset="0"/>
-              </a:rPr>
-              <a:t>&lt;filename&gt;.</a:t>
-            </a:r>
-            <a:r>
-              <a:rPr lang="en-AU" sz="4000" i="1" dirty="0" err="1">
-                <a:latin typeface="Consolas" panose="020B0609020204030204" pitchFamily="49" charset="0"/>
-              </a:rPr>
-              <a:t>exs</a:t>
-            </a:r>
-            <a:endParaRPr lang="en-AU" sz="4000" dirty="0">
-              <a:latin typeface="Consolas" panose="020B0609020204030204" pitchFamily="49" charset="0"/>
-            </a:endParaRPr>
+              <a:rPr lang="en-AU" sz="4400" b="1" dirty="0">
+                <a:latin typeface="Consolas" panose="020B0609020204030204" pitchFamily="49" charset="0"/>
+              </a:rPr>
+              <a:t>mix </a:t>
+            </a:r>
+            <a:r>
+              <a:rPr lang="en-AU" sz="4400" dirty="0">
+                <a:latin typeface="Consolas" panose="020B0609020204030204" pitchFamily="49" charset="0"/>
+              </a:rPr>
+              <a:t>compile</a:t>
+            </a:r>
           </a:p>
         </p:txBody>
       </p:sp>
@@ -6450,7 +7475,9 @@
         </p:nvSpPr>
         <p:spPr/>
         <p:txBody>
-          <a:bodyPr/>
+          <a:bodyPr>
+            <a:normAutofit/>
+          </a:bodyPr>
           <a:lstStyle/>
           <a:p>
             <a:r>
@@ -6460,16 +7487,7 @@
                 </a:solidFill>
                 <a:latin typeface="Lato" panose="020F0502020204030203" pitchFamily="34" charset="0"/>
               </a:rPr>
-              <a:t>Basics: </a:t>
-            </a:r>
-            <a:r>
-              <a:rPr lang="en-AU" sz="5400" dirty="0">
-                <a:solidFill>
-                  <a:srgbClr val="000000"/>
-                </a:solidFill>
-                <a:latin typeface="Lato" panose="020F0502020204030203" pitchFamily="34" charset="0"/>
-              </a:rPr>
-              <a:t>Modules &amp; Functions</a:t>
+              <a:t>But wait… there’s more</a:t>
             </a:r>
             <a:endParaRPr lang="en-AU" dirty="0"/>
           </a:p>
@@ -6504,213 +7522,114 @@
           <a:lstStyle/>
           <a:p>
             <a:pPr marL="0" indent="0">
+              <a:lnSpc>
+                <a:spcPct val="150000"/>
+              </a:lnSpc>
               <a:buNone/>
             </a:pPr>
             <a:r>
+              <a:rPr lang="en-US" sz="2800" b="1" u="sng" dirty="0">
+                <a:latin typeface="Consolas" panose="020B0609020204030204" pitchFamily="49" charset="0"/>
+              </a:rPr>
+              <a:t>Mix</a:t>
+            </a:r>
+            <a:r>
+              <a:rPr lang="en-US" sz="2800" dirty="0">
+                <a:latin typeface="Consolas" panose="020B0609020204030204" pitchFamily="49" charset="0"/>
+              </a:rPr>
+              <a:t> is a build tool for Elixir that provides tasks for creating, compiling, testing your application, managing its dependencies and more.</a:t>
+            </a:r>
+          </a:p>
+          <a:p>
+            <a:pPr marL="0" indent="0">
+              <a:lnSpc>
+                <a:spcPct val="150000"/>
+              </a:lnSpc>
+              <a:buNone/>
+            </a:pPr>
+            <a:r>
+              <a:rPr lang="en-US" sz="2800" b="1" dirty="0">
+                <a:latin typeface="Consolas" panose="020B0609020204030204" pitchFamily="49" charset="0"/>
+              </a:rPr>
+              <a:t>Create project: &gt; mix </a:t>
+            </a:r>
+            <a:r>
+              <a:rPr lang="en-US" sz="2800" dirty="0">
+                <a:latin typeface="Consolas" panose="020B0609020204030204" pitchFamily="49" charset="0"/>
+              </a:rPr>
+              <a:t>new &lt;</a:t>
+            </a:r>
+            <a:r>
+              <a:rPr lang="en-US" sz="2800" dirty="0" err="1">
+                <a:latin typeface="Consolas" panose="020B0609020204030204" pitchFamily="49" charset="0"/>
+              </a:rPr>
+              <a:t>project_name</a:t>
+            </a:r>
+            <a:r>
+              <a:rPr lang="en-US" sz="2800" dirty="0">
+                <a:latin typeface="Consolas" panose="020B0609020204030204" pitchFamily="49" charset="0"/>
+              </a:rPr>
+              <a:t>&gt;</a:t>
+            </a:r>
+            <a:br>
+              <a:rPr lang="en-US" sz="2800" dirty="0">
+                <a:latin typeface="Consolas" panose="020B0609020204030204" pitchFamily="49" charset="0"/>
+              </a:rPr>
+            </a:br>
+            <a:r>
+              <a:rPr lang="en-US" sz="2800" b="1" dirty="0">
+                <a:latin typeface="Consolas" panose="020B0609020204030204" pitchFamily="49" charset="0"/>
+              </a:rPr>
+              <a:t>Build files: &gt; mix</a:t>
+            </a:r>
+            <a:r>
+              <a:rPr lang="en-US" sz="2800" dirty="0">
+                <a:latin typeface="Consolas" panose="020B0609020204030204" pitchFamily="49" charset="0"/>
+              </a:rPr>
+              <a:t> compile</a:t>
+            </a:r>
+            <a:br>
               <a:rPr lang="en-AU" sz="2800" dirty="0">
                 <a:latin typeface="Consolas" panose="020B0609020204030204" pitchFamily="49" charset="0"/>
               </a:rPr>
-              <a:t>#</a:t>
+            </a:br>
+            <a:r>
+              <a:rPr lang="en-AU" sz="2800" b="1" dirty="0">
+                <a:latin typeface="Consolas" panose="020B0609020204030204" pitchFamily="49" charset="0"/>
+              </a:rPr>
+              <a:t>Run tests: &gt; mix </a:t>
+            </a:r>
+            <a:r>
+              <a:rPr lang="en-AU" sz="2800" dirty="0">
+                <a:latin typeface="Consolas" panose="020B0609020204030204" pitchFamily="49" charset="0"/>
+              </a:rPr>
+              <a:t>test [&lt;</a:t>
             </a:r>
             <a:r>
               <a:rPr lang="en-AU" sz="2800" dirty="0" err="1">
                 <a:latin typeface="Consolas" panose="020B0609020204030204" pitchFamily="49" charset="0"/>
               </a:rPr>
-              <a:t>math.exs</a:t>
-            </a:r>
-            <a:endParaRPr lang="en-AU" sz="2800" dirty="0">
-              <a:latin typeface="Consolas" panose="020B0609020204030204" pitchFamily="49" charset="0"/>
-            </a:endParaRPr>
-          </a:p>
-          <a:p>
-            <a:pPr marL="0" indent="0">
-              <a:buNone/>
-            </a:pPr>
-            <a:r>
-              <a:rPr lang="en-AU" sz="2800" b="1" dirty="0" err="1">
-                <a:latin typeface="Consolas" panose="020B0609020204030204" pitchFamily="49" charset="0"/>
-              </a:rPr>
-              <a:t>defmodule</a:t>
+              <a:t>test_name</a:t>
             </a:r>
             <a:r>
               <a:rPr lang="en-AU" sz="2800" dirty="0">
                 <a:latin typeface="Consolas" panose="020B0609020204030204" pitchFamily="49" charset="0"/>
               </a:rPr>
-              <a:t> Math </a:t>
-            </a:r>
-            <a:r>
-              <a:rPr lang="en-AU" sz="2800" b="1" dirty="0">
-                <a:latin typeface="Consolas" panose="020B0609020204030204" pitchFamily="49" charset="0"/>
-              </a:rPr>
-              <a:t>do</a:t>
-            </a:r>
-          </a:p>
-          <a:p>
-            <a:pPr marL="0" indent="0">
-              <a:buNone/>
-            </a:pPr>
-            <a:r>
-              <a:rPr lang="en-AU" sz="2800" b="1" dirty="0">
-                <a:latin typeface="Consolas" panose="020B0609020204030204" pitchFamily="49" charset="0"/>
-              </a:rPr>
-              <a:t>	</a:t>
+              <a:t>&gt;:&lt;</a:t>
+            </a:r>
+            <a:r>
+              <a:rPr lang="en-AU" sz="2800" dirty="0" err="1">
+                <a:latin typeface="Consolas" panose="020B0609020204030204" pitchFamily="49" charset="0"/>
+              </a:rPr>
+              <a:t>line_number</a:t>
             </a:r>
             <a:r>
               <a:rPr lang="en-AU" sz="2800" dirty="0">
                 <a:latin typeface="Consolas" panose="020B0609020204030204" pitchFamily="49" charset="0"/>
               </a:rPr>
-              <a:t>#Named function</a:t>
-            </a:r>
-            <a:endParaRPr lang="en-AU" sz="2800" b="1" dirty="0">
-              <a:latin typeface="Consolas" panose="020B0609020204030204" pitchFamily="49" charset="0"/>
-            </a:endParaRPr>
-          </a:p>
-          <a:p>
-            <a:pPr marL="0" indent="0">
-              <a:buNone/>
-            </a:pPr>
-            <a:r>
-              <a:rPr lang="en-AU" sz="2800" b="1" dirty="0">
-                <a:latin typeface="Consolas" panose="020B0609020204030204" pitchFamily="49" charset="0"/>
-              </a:rPr>
-              <a:t>	def</a:t>
-            </a:r>
-            <a:r>
-              <a:rPr lang="en-AU" sz="2800" dirty="0">
-                <a:latin typeface="Consolas" panose="020B0609020204030204" pitchFamily="49" charset="0"/>
-              </a:rPr>
-              <a:t> sum(a, b) </a:t>
-            </a:r>
-            <a:r>
-              <a:rPr lang="en-AU" sz="2800" b="1" dirty="0">
-                <a:latin typeface="Consolas" panose="020B0609020204030204" pitchFamily="49" charset="0"/>
-              </a:rPr>
-              <a:t>do </a:t>
-            </a:r>
-            <a:r>
-              <a:rPr lang="en-AU" sz="2800" dirty="0">
-                <a:latin typeface="Consolas" panose="020B0609020204030204" pitchFamily="49" charset="0"/>
-              </a:rPr>
-              <a:t>a + b </a:t>
-            </a:r>
-            <a:r>
-              <a:rPr lang="en-AU" sz="2800" b="1" dirty="0">
-                <a:latin typeface="Consolas" panose="020B0609020204030204" pitchFamily="49" charset="0"/>
-              </a:rPr>
-              <a:t>end</a:t>
-            </a:r>
-          </a:p>
-          <a:p>
-            <a:pPr marL="0" indent="0">
-              <a:buNone/>
-            </a:pPr>
-            <a:r>
-              <a:rPr lang="en-AU" sz="2800" b="1" dirty="0">
-                <a:latin typeface="Consolas" panose="020B0609020204030204" pitchFamily="49" charset="0"/>
-              </a:rPr>
-              <a:t>end</a:t>
-            </a:r>
-          </a:p>
-          <a:p>
-            <a:pPr marL="0" indent="0">
-              <a:buNone/>
-            </a:pPr>
-            <a:r>
-              <a:rPr lang="en-AU" sz="2800" dirty="0">
-                <a:latin typeface="Consolas" panose="020B0609020204030204" pitchFamily="49" charset="0"/>
-              </a:rPr>
-              <a:t>#Anonymous function</a:t>
-            </a:r>
-          </a:p>
-          <a:p>
-            <a:pPr marL="0" indent="0">
-              <a:buNone/>
-            </a:pPr>
-            <a:r>
-              <a:rPr lang="en-AU" sz="2800" dirty="0">
-                <a:latin typeface="Consolas" panose="020B0609020204030204" pitchFamily="49" charset="0"/>
-              </a:rPr>
-              <a:t>sum </a:t>
-            </a:r>
-            <a:r>
-              <a:rPr lang="en-AU" sz="2800" b="1" dirty="0">
-                <a:latin typeface="Consolas" panose="020B0609020204030204" pitchFamily="49" charset="0"/>
-              </a:rPr>
-              <a:t>= </a:t>
-            </a:r>
-            <a:r>
-              <a:rPr lang="en-AU" sz="2800" b="1" dirty="0" err="1">
-                <a:latin typeface="Consolas" panose="020B0609020204030204" pitchFamily="49" charset="0"/>
-              </a:rPr>
-              <a:t>fn</a:t>
-            </a:r>
-            <a:r>
-              <a:rPr lang="en-AU" sz="2800" dirty="0">
-                <a:latin typeface="Consolas" panose="020B0609020204030204" pitchFamily="49" charset="0"/>
-              </a:rPr>
-              <a:t> </a:t>
-            </a:r>
-            <a:r>
-              <a:rPr lang="en-AU" sz="2800" dirty="0" err="1">
-                <a:latin typeface="Consolas" panose="020B0609020204030204" pitchFamily="49" charset="0"/>
-              </a:rPr>
-              <a:t>a,b</a:t>
-            </a:r>
-            <a:r>
-              <a:rPr lang="en-AU" sz="2800" dirty="0">
-                <a:latin typeface="Consolas" panose="020B0609020204030204" pitchFamily="49" charset="0"/>
-              </a:rPr>
-              <a:t> </a:t>
-            </a:r>
-            <a:r>
-              <a:rPr lang="en-AU" sz="2800" b="1" dirty="0">
-                <a:latin typeface="Consolas" panose="020B0609020204030204" pitchFamily="49" charset="0"/>
-              </a:rPr>
-              <a:t>-&gt;</a:t>
-            </a:r>
-            <a:r>
-              <a:rPr lang="en-AU" sz="2800" dirty="0">
-                <a:latin typeface="Consolas" panose="020B0609020204030204" pitchFamily="49" charset="0"/>
-              </a:rPr>
-              <a:t> a + b </a:t>
-            </a:r>
-            <a:r>
-              <a:rPr lang="en-AU" sz="2800" b="1" dirty="0">
-                <a:latin typeface="Consolas" panose="020B0609020204030204" pitchFamily="49" charset="0"/>
-              </a:rPr>
-              <a:t>end </a:t>
-            </a:r>
-            <a:r>
-              <a:rPr lang="en-AU" sz="2800" dirty="0">
-                <a:latin typeface="Consolas" panose="020B0609020204030204" pitchFamily="49" charset="0"/>
-              </a:rPr>
-              <a:t>#invoked as sum</a:t>
-            </a:r>
-            <a:r>
-              <a:rPr lang="en-AU" sz="2800" b="1" u="sng" dirty="0">
-                <a:latin typeface="Consolas" panose="020B0609020204030204" pitchFamily="49" charset="0"/>
-              </a:rPr>
-              <a:t>.</a:t>
-            </a:r>
-            <a:r>
-              <a:rPr lang="en-AU" sz="2800" dirty="0">
-                <a:latin typeface="Consolas" panose="020B0609020204030204" pitchFamily="49" charset="0"/>
-              </a:rPr>
-              <a:t>(</a:t>
-            </a:r>
-            <a:r>
-              <a:rPr lang="en-AU" sz="2800" dirty="0" err="1">
-                <a:latin typeface="Consolas" panose="020B0609020204030204" pitchFamily="49" charset="0"/>
-              </a:rPr>
-              <a:t>a,b</a:t>
-            </a:r>
-            <a:r>
-              <a:rPr lang="en-AU" sz="2800" dirty="0">
-                <a:latin typeface="Consolas" panose="020B0609020204030204" pitchFamily="49" charset="0"/>
-              </a:rPr>
-              <a:t>)</a:t>
-            </a:r>
-            <a:endParaRPr lang="en-AU" sz="2800" b="1" dirty="0">
+              <a:t>&gt;]</a:t>
+            </a:r>
+            <a:endParaRPr lang="en-US" sz="2800" dirty="0">
               <a:latin typeface="Consolas" panose="020B0609020204030204" pitchFamily="49" charset="0"/>
             </a:endParaRPr>
           </a:p>
@@ -6719,7 +7638,7 @@
     </p:spTree>
     <p:extLst>
       <p:ext uri="{BB962C8B-B14F-4D97-AF65-F5344CB8AC3E}">
-        <p14:creationId xmlns:p14="http://schemas.microsoft.com/office/powerpoint/2010/main" val="324277023"/>
+        <p14:creationId xmlns:p14="http://schemas.microsoft.com/office/powerpoint/2010/main" val="3121632666"/>
       </p:ext>
     </p:extLst>
   </p:cSld>

</xml_diff>